<commit_message>
added contrast to netconf
</commit_message>
<xml_diff>
--- a/ietf95_6tisch_security_summary.pptx
+++ b/ietf95_6tisch_security_summary.pptx
@@ -12,6 +12,9 @@
     <p:sldId id="260" r:id="rId7"/>
     <p:sldId id="261" r:id="rId8"/>
     <p:sldId id="262" r:id="rId9"/>
+    <p:sldId id="263" r:id="rId10"/>
+    <p:sldId id="264" r:id="rId11"/>
+    <p:sldId id="265" r:id="rId12"/>
   </p:sldIdLst>
   <p:sldSz cx="10080625" cy="7559675"/>
   <p:notesSz cx="7772400" cy="10058400"/>
@@ -59,7 +62,7 @@
       </p:grpSpPr>
       <p:sp>
         <p:nvSpPr>
-          <p:cNvPr id="28" name="PlaceHolder 1"/>
+          <p:cNvPr id="29" name="PlaceHolder 1"/>
           <p:cNvSpPr>
             <a:spLocks noGrp="1"/>
           </p:cNvSpPr>
@@ -86,7 +89,7 @@
       </p:sp>
       <p:sp>
         <p:nvSpPr>
-          <p:cNvPr id="29" name="PlaceHolder 2"/>
+          <p:cNvPr id="30" name="PlaceHolder 2"/>
           <p:cNvSpPr>
             <a:spLocks noGrp="1"/>
           </p:cNvSpPr>
@@ -112,7 +115,7 @@
       </p:sp>
       <p:sp>
         <p:nvSpPr>
-          <p:cNvPr id="30" name="PlaceHolder 3"/>
+          <p:cNvPr id="31" name="PlaceHolder 3"/>
           <p:cNvSpPr>
             <a:spLocks noGrp="1"/>
           </p:cNvSpPr>
@@ -160,7 +163,7 @@
       </p:grpSpPr>
       <p:sp>
         <p:nvSpPr>
-          <p:cNvPr id="31" name="PlaceHolder 1"/>
+          <p:cNvPr id="32" name="PlaceHolder 1"/>
           <p:cNvSpPr>
             <a:spLocks noGrp="1"/>
           </p:cNvSpPr>
@@ -187,7 +190,7 @@
       </p:sp>
       <p:sp>
         <p:nvSpPr>
-          <p:cNvPr id="32" name="PlaceHolder 2"/>
+          <p:cNvPr id="33" name="PlaceHolder 2"/>
           <p:cNvSpPr>
             <a:spLocks noGrp="1"/>
           </p:cNvSpPr>
@@ -213,7 +216,7 @@
       </p:sp>
       <p:sp>
         <p:nvSpPr>
-          <p:cNvPr id="33" name="PlaceHolder 3"/>
+          <p:cNvPr id="34" name="PlaceHolder 3"/>
           <p:cNvSpPr>
             <a:spLocks noGrp="1"/>
           </p:cNvSpPr>
@@ -239,7 +242,7 @@
       </p:sp>
       <p:sp>
         <p:nvSpPr>
-          <p:cNvPr id="34" name="PlaceHolder 4"/>
+          <p:cNvPr id="35" name="PlaceHolder 4"/>
           <p:cNvSpPr>
             <a:spLocks noGrp="1"/>
           </p:cNvSpPr>
@@ -265,7 +268,7 @@
       </p:sp>
       <p:sp>
         <p:nvSpPr>
-          <p:cNvPr id="35" name="PlaceHolder 5"/>
+          <p:cNvPr id="36" name="PlaceHolder 5"/>
           <p:cNvSpPr>
             <a:spLocks noGrp="1"/>
           </p:cNvSpPr>
@@ -313,7 +316,7 @@
       </p:grpSpPr>
       <p:sp>
         <p:nvSpPr>
-          <p:cNvPr id="36" name="PlaceHolder 1"/>
+          <p:cNvPr id="37" name="PlaceHolder 1"/>
           <p:cNvSpPr>
             <a:spLocks noGrp="1"/>
           </p:cNvSpPr>
@@ -340,7 +343,7 @@
       </p:sp>
       <p:sp>
         <p:nvSpPr>
-          <p:cNvPr id="37" name="PlaceHolder 2"/>
+          <p:cNvPr id="38" name="PlaceHolder 2"/>
           <p:cNvSpPr>
             <a:spLocks noGrp="1"/>
           </p:cNvSpPr>
@@ -366,7 +369,7 @@
       </p:sp>
       <p:sp>
         <p:nvSpPr>
-          <p:cNvPr id="38" name="PlaceHolder 3"/>
+          <p:cNvPr id="39" name="PlaceHolder 3"/>
           <p:cNvSpPr>
             <a:spLocks noGrp="1"/>
           </p:cNvSpPr>
@@ -414,7 +417,7 @@
       </p:grpSpPr>
       <p:sp>
         <p:nvSpPr>
-          <p:cNvPr id="7" name="PlaceHolder 1"/>
+          <p:cNvPr id="8" name="PlaceHolder 1"/>
           <p:cNvSpPr>
             <a:spLocks noGrp="1"/>
           </p:cNvSpPr>
@@ -441,7 +444,7 @@
       </p:sp>
       <p:sp>
         <p:nvSpPr>
-          <p:cNvPr id="8" name="PlaceHolder 2"/>
+          <p:cNvPr id="9" name="PlaceHolder 2"/>
           <p:cNvSpPr>
             <a:spLocks noGrp="1"/>
           </p:cNvSpPr>
@@ -490,7 +493,7 @@
       </p:grpSpPr>
       <p:sp>
         <p:nvSpPr>
-          <p:cNvPr id="9" name="PlaceHolder 1"/>
+          <p:cNvPr id="10" name="PlaceHolder 1"/>
           <p:cNvSpPr>
             <a:spLocks noGrp="1"/>
           </p:cNvSpPr>
@@ -517,7 +520,7 @@
       </p:sp>
       <p:sp>
         <p:nvSpPr>
-          <p:cNvPr id="10" name="PlaceHolder 2"/>
+          <p:cNvPr id="11" name="PlaceHolder 2"/>
           <p:cNvSpPr>
             <a:spLocks noGrp="1"/>
           </p:cNvSpPr>
@@ -565,7 +568,7 @@
       </p:grpSpPr>
       <p:sp>
         <p:nvSpPr>
-          <p:cNvPr id="11" name="PlaceHolder 1"/>
+          <p:cNvPr id="12" name="PlaceHolder 1"/>
           <p:cNvSpPr>
             <a:spLocks noGrp="1"/>
           </p:cNvSpPr>
@@ -592,7 +595,7 @@
       </p:sp>
       <p:sp>
         <p:nvSpPr>
-          <p:cNvPr id="12" name="PlaceHolder 2"/>
+          <p:cNvPr id="13" name="PlaceHolder 2"/>
           <p:cNvSpPr>
             <a:spLocks noGrp="1"/>
           </p:cNvSpPr>
@@ -618,7 +621,7 @@
       </p:sp>
       <p:sp>
         <p:nvSpPr>
-          <p:cNvPr id="13" name="PlaceHolder 3"/>
+          <p:cNvPr id="14" name="PlaceHolder 3"/>
           <p:cNvSpPr>
             <a:spLocks noGrp="1"/>
           </p:cNvSpPr>
@@ -666,7 +669,7 @@
       </p:grpSpPr>
       <p:sp>
         <p:nvSpPr>
-          <p:cNvPr id="14" name="PlaceHolder 1"/>
+          <p:cNvPr id="15" name="PlaceHolder 1"/>
           <p:cNvSpPr>
             <a:spLocks noGrp="1"/>
           </p:cNvSpPr>
@@ -715,7 +718,7 @@
       </p:grpSpPr>
       <p:sp>
         <p:nvSpPr>
-          <p:cNvPr id="15" name="PlaceHolder 1"/>
+          <p:cNvPr id="16" name="PlaceHolder 1"/>
           <p:cNvSpPr>
             <a:spLocks noGrp="1"/>
           </p:cNvSpPr>
@@ -764,7 +767,7 @@
       </p:grpSpPr>
       <p:sp>
         <p:nvSpPr>
-          <p:cNvPr id="16" name="PlaceHolder 1"/>
+          <p:cNvPr id="17" name="PlaceHolder 1"/>
           <p:cNvSpPr>
             <a:spLocks noGrp="1"/>
           </p:cNvSpPr>
@@ -791,7 +794,7 @@
       </p:sp>
       <p:sp>
         <p:nvSpPr>
-          <p:cNvPr id="17" name="PlaceHolder 2"/>
+          <p:cNvPr id="18" name="PlaceHolder 2"/>
           <p:cNvSpPr>
             <a:spLocks noGrp="1"/>
           </p:cNvSpPr>
@@ -817,7 +820,7 @@
       </p:sp>
       <p:sp>
         <p:nvSpPr>
-          <p:cNvPr id="18" name="PlaceHolder 3"/>
+          <p:cNvPr id="19" name="PlaceHolder 3"/>
           <p:cNvSpPr>
             <a:spLocks noGrp="1"/>
           </p:cNvSpPr>
@@ -843,7 +846,7 @@
       </p:sp>
       <p:sp>
         <p:nvSpPr>
-          <p:cNvPr id="19" name="PlaceHolder 4"/>
+          <p:cNvPr id="20" name="PlaceHolder 4"/>
           <p:cNvSpPr>
             <a:spLocks noGrp="1"/>
           </p:cNvSpPr>
@@ -891,7 +894,7 @@
       </p:grpSpPr>
       <p:sp>
         <p:nvSpPr>
-          <p:cNvPr id="20" name="PlaceHolder 1"/>
+          <p:cNvPr id="21" name="PlaceHolder 1"/>
           <p:cNvSpPr>
             <a:spLocks noGrp="1"/>
           </p:cNvSpPr>
@@ -918,7 +921,7 @@
       </p:sp>
       <p:sp>
         <p:nvSpPr>
-          <p:cNvPr id="21" name="PlaceHolder 2"/>
+          <p:cNvPr id="22" name="PlaceHolder 2"/>
           <p:cNvSpPr>
             <a:spLocks noGrp="1"/>
           </p:cNvSpPr>
@@ -944,7 +947,7 @@
       </p:sp>
       <p:sp>
         <p:nvSpPr>
-          <p:cNvPr id="22" name="PlaceHolder 3"/>
+          <p:cNvPr id="23" name="PlaceHolder 3"/>
           <p:cNvSpPr>
             <a:spLocks noGrp="1"/>
           </p:cNvSpPr>
@@ -970,7 +973,7 @@
       </p:sp>
       <p:sp>
         <p:nvSpPr>
-          <p:cNvPr id="23" name="PlaceHolder 4"/>
+          <p:cNvPr id="24" name="PlaceHolder 4"/>
           <p:cNvSpPr>
             <a:spLocks noGrp="1"/>
           </p:cNvSpPr>
@@ -1018,7 +1021,7 @@
       </p:grpSpPr>
       <p:sp>
         <p:nvSpPr>
-          <p:cNvPr id="24" name="PlaceHolder 1"/>
+          <p:cNvPr id="25" name="PlaceHolder 1"/>
           <p:cNvSpPr>
             <a:spLocks noGrp="1"/>
           </p:cNvSpPr>
@@ -1045,7 +1048,7 @@
       </p:sp>
       <p:sp>
         <p:nvSpPr>
-          <p:cNvPr id="25" name="PlaceHolder 2"/>
+          <p:cNvPr id="26" name="PlaceHolder 2"/>
           <p:cNvSpPr>
             <a:spLocks noGrp="1"/>
           </p:cNvSpPr>
@@ -1071,7 +1074,7 @@
       </p:sp>
       <p:sp>
         <p:nvSpPr>
-          <p:cNvPr id="26" name="PlaceHolder 3"/>
+          <p:cNvPr id="27" name="PlaceHolder 3"/>
           <p:cNvSpPr>
             <a:spLocks noGrp="1"/>
           </p:cNvSpPr>
@@ -1097,7 +1100,7 @@
       </p:sp>
       <p:sp>
         <p:nvSpPr>
-          <p:cNvPr id="27" name="PlaceHolder 4"/>
+          <p:cNvPr id="28" name="PlaceHolder 4"/>
           <p:cNvSpPr>
             <a:spLocks noGrp="1"/>
           </p:cNvSpPr>
@@ -1294,7 +1297,7 @@
         <p:spPr>
           <a:xfrm>
             <a:off x="504000" y="1769040"/>
-            <a:ext cx="9071640" cy="4384800"/>
+            <a:ext cx="8870040" cy="4384800"/>
           </a:xfrm>
           <a:prstGeom prst="rect">
             <a:avLst/>
@@ -1401,7 +1404,7 @@
         <p:spPr>
           <a:xfrm>
             <a:off x="504000" y="1769040"/>
-            <a:ext cx="8870040" cy="4384800"/>
+            <a:ext cx="9071640" cy="4384800"/>
           </a:xfrm>
           <a:prstGeom prst="rect">
             <a:avLst/>
@@ -1498,6 +1501,113 @@
       <p:sp>
         <p:nvSpPr>
           <p:cNvPr id="4" name="PlaceHolder 5"/>
+          <p:cNvSpPr>
+            <a:spLocks noGrp="1"/>
+          </p:cNvSpPr>
+          <p:nvPr>
+            <p:ph type="body"/>
+          </p:nvPr>
+        </p:nvSpPr>
+        <p:spPr>
+          <a:xfrm>
+            <a:off x="504000" y="1769040"/>
+            <a:ext cx="8870040" cy="4384800"/>
+          </a:xfrm>
+          <a:prstGeom prst="rect">
+            <a:avLst/>
+          </a:prstGeom>
+        </p:spPr>
+        <p:txBody>
+          <a:bodyPr bIns="0" lIns="0" rIns="0" tIns="0" wrap="none"/>
+          <a:p>
+            <a:pPr>
+              <a:buSzPct val="45000"/>
+              <a:buFont typeface="StarSymbol"/>
+              <a:buChar char=""/>
+            </a:pPr>
+            <a:r>
+              <a:rPr lang="en-US"/>
+              <a:t>Click to edit the outline text format</a:t>
+            </a:r>
+            <a:endParaRPr/>
+          </a:p>
+          <a:p>
+            <a:pPr lvl="1">
+              <a:buSzPct val="75000"/>
+              <a:buFont typeface="StarSymbol"/>
+              <a:buChar char=""/>
+            </a:pPr>
+            <a:r>
+              <a:rPr lang="en-US"/>
+              <a:t>Second Outline Level</a:t>
+            </a:r>
+            <a:endParaRPr/>
+          </a:p>
+          <a:p>
+            <a:pPr lvl="2">
+              <a:buSzPct val="45000"/>
+              <a:buFont typeface="StarSymbol"/>
+              <a:buChar char=""/>
+            </a:pPr>
+            <a:r>
+              <a:rPr lang="en-US"/>
+              <a:t>Third Outline Level</a:t>
+            </a:r>
+            <a:endParaRPr/>
+          </a:p>
+          <a:p>
+            <a:pPr lvl="3">
+              <a:buSzPct val="75000"/>
+              <a:buFont typeface="StarSymbol"/>
+              <a:buChar char=""/>
+            </a:pPr>
+            <a:r>
+              <a:rPr lang="en-US"/>
+              <a:t>Fourth Outline Level</a:t>
+            </a:r>
+            <a:endParaRPr/>
+          </a:p>
+          <a:p>
+            <a:pPr lvl="4">
+              <a:buSzPct val="45000"/>
+              <a:buFont typeface="StarSymbol"/>
+              <a:buChar char=""/>
+            </a:pPr>
+            <a:r>
+              <a:rPr lang="en-US"/>
+              <a:t>Fifth Outline Level</a:t>
+            </a:r>
+            <a:endParaRPr/>
+          </a:p>
+          <a:p>
+            <a:pPr lvl="5">
+              <a:buSzPct val="45000"/>
+              <a:buFont typeface="StarSymbol"/>
+              <a:buChar char=""/>
+            </a:pPr>
+            <a:r>
+              <a:rPr lang="en-US"/>
+              <a:t>Sixth Outline Level</a:t>
+            </a:r>
+            <a:endParaRPr/>
+          </a:p>
+          <a:p>
+            <a:pPr lvl="6">
+              <a:buSzPct val="45000"/>
+              <a:buFont typeface="StarSymbol"/>
+              <a:buChar char=""/>
+            </a:pPr>
+            <a:r>
+              <a:rPr lang="en-US"/>
+              <a:t>Seventh Outline Level</a:t>
+            </a:r>
+            <a:endParaRPr/>
+          </a:p>
+        </p:txBody>
+      </p:sp>
+      <p:sp>
+        <p:nvSpPr>
+          <p:cNvPr id="5" name="PlaceHolder 6"/>
           <p:cNvSpPr>
             <a:spLocks noGrp="1"/>
           </p:cNvSpPr>
@@ -1521,13 +1631,17 @@
               <a:rPr lang="en-US" sz="1400"/>
               <a:t>&lt;date/time&gt;</a:t>
             </a:r>
-            <a:endParaRPr/>
-          </a:p>
-        </p:txBody>
-      </p:sp>
-      <p:sp>
-        <p:nvSpPr>
-          <p:cNvPr id="5" name="PlaceHolder 6"/>
+            <a:r>
+              <a:rPr lang="en-US"/>
+              <a:t>&lt;date/time&gt;</a:t>
+            </a:r>
+            <a:endParaRPr/>
+          </a:p>
+        </p:txBody>
+      </p:sp>
+      <p:sp>
+        <p:nvSpPr>
+          <p:cNvPr id="6" name="PlaceHolder 7"/>
           <p:cNvSpPr>
             <a:spLocks noGrp="1"/>
           </p:cNvSpPr>
@@ -1552,13 +1666,17 @@
               <a:rPr lang="en-US" sz="1400"/>
               <a:t>&lt;footer&gt;</a:t>
             </a:r>
-            <a:endParaRPr/>
-          </a:p>
-        </p:txBody>
-      </p:sp>
-      <p:sp>
-        <p:nvSpPr>
-          <p:cNvPr id="6" name="PlaceHolder 7"/>
+            <a:r>
+              <a:rPr lang="en-US"/>
+              <a:t>&lt;footer&gt;</a:t>
+            </a:r>
+            <a:endParaRPr/>
+          </a:p>
+        </p:txBody>
+      </p:sp>
+      <p:sp>
+        <p:nvSpPr>
+          <p:cNvPr id="7" name="PlaceHolder 8"/>
           <p:cNvSpPr>
             <a:spLocks noGrp="1"/>
           </p:cNvSpPr>
@@ -1579,8 +1697,8 @@
           <a:bodyPr bIns="0" lIns="0" rIns="0" tIns="0" wrap="none"/>
           <a:p>
             <a:pPr algn="r"/>
-            <a:fld id="{31614181-0111-4100-B191-515171811101}" type="slidenum">
-              <a:rPr lang="en-US"/>
+            <a:fld id="{01B18191-2171-4101-A100-215171E1D111}" type="slidenum">
+              <a:rPr lang="en-US" sz="1400"/>
               <a:t>&lt;number&gt;</a:t>
             </a:fld>
             <a:endParaRPr/>
@@ -1626,7 +1744,7 @@
       </p:grpSpPr>
       <p:sp>
         <p:nvSpPr>
-          <p:cNvPr id="39" name="TextShape 1"/>
+          <p:cNvPr id="40" name="TextShape 1"/>
           <p:cNvSpPr txBox="1"/>
           <p:nvPr/>
         </p:nvSpPr>
@@ -1662,7 +1780,7 @@
       </p:sp>
       <p:sp>
         <p:nvSpPr>
-          <p:cNvPr id="40" name="TextShape 2"/>
+          <p:cNvPr id="41" name="TextShape 2"/>
           <p:cNvSpPr txBox="1"/>
           <p:nvPr/>
         </p:nvSpPr>
@@ -1787,6 +1905,117 @@
           </a:p>
         </p:txBody>
       </p:sp>
+      <p:sp>
+        <p:nvSpPr>
+          <p:cNvPr id="42" name="TextShape 3"/>
+          <p:cNvSpPr txBox="1"/>
+          <p:nvPr/>
+        </p:nvSpPr>
+        <p:spPr>
+          <a:xfrm>
+            <a:off x="8352000" y="2808000"/>
+            <a:ext cx="1642320" cy="858240"/>
+          </a:xfrm>
+          <a:prstGeom prst="rect">
+            <a:avLst/>
+          </a:prstGeom>
+        </p:spPr>
+        <p:txBody>
+          <a:bodyPr bIns="45000" lIns="90000" rIns="90000" tIns="45000" wrap="none"/>
+          <a:p>
+            <a:r>
+              <a:rPr lang="en-US"/>
+              <a:t>For 6tisch WG</a:t>
+            </a:r>
+            <a:endParaRPr/>
+          </a:p>
+          <a:p>
+            <a:r>
+              <a:rPr lang="en-US"/>
+              <a:t>And netconf</a:t>
+            </a:r>
+            <a:endParaRPr/>
+          </a:p>
+          <a:p>
+            <a:r>
+              <a:rPr lang="en-US"/>
+              <a:t>And ANIMA</a:t>
+            </a:r>
+            <a:endParaRPr/>
+          </a:p>
+        </p:txBody>
+      </p:sp>
+    </p:spTree>
+  </p:cSld>
+</p:sld>
+</file>
+
+<file path=ppt/slides/slide10.xml><?xml version="1.0" encoding="utf-8"?>
+<p:sld xmlns:a="http://schemas.openxmlformats.org/drawingml/2006/main" xmlns:p="http://schemas.openxmlformats.org/presentationml/2006/main" xmlns:r="http://schemas.openxmlformats.org/officeDocument/2006/relationships">
+  <p:cSld>
+    <p:spTree>
+      <p:nvGrpSpPr>
+        <p:cNvPr id="1" name=""/>
+        <p:cNvGrpSpPr/>
+        <p:nvPr/>
+      </p:nvGrpSpPr>
+      <p:grpSpPr>
+        <a:xfrm>
+          <a:off x="0" y="0"/>
+          <a:ext cx="0" cy="0"/>
+          <a:chOff x="0" y="0"/>
+          <a:chExt cx="0" cy="0"/>
+        </a:xfrm>
+      </p:grpSpPr>
+      <p:sp>
+        <p:nvSpPr>
+          <p:cNvPr id="82" name="TextShape 1"/>
+          <p:cNvSpPr txBox="1"/>
+          <p:nvPr/>
+        </p:nvSpPr>
+        <p:spPr>
+          <a:xfrm>
+            <a:off x="504000" y="301320"/>
+            <a:ext cx="9071640" cy="1262160"/>
+          </a:xfrm>
+          <a:prstGeom prst="rect">
+            <a:avLst/>
+          </a:prstGeom>
+        </p:spPr>
+        <p:txBody>
+          <a:bodyPr anchor="ctr" bIns="0" lIns="0" rIns="0" tIns="0" wrap="none"/>
+          <a:p>
+            <a:pPr algn="ctr"/>
+            <a:r>
+              <a:rPr lang="en-US"/>
+              <a:t>Funny Icons for other slides</a:t>
+            </a:r>
+            <a:endParaRPr/>
+          </a:p>
+        </p:txBody>
+      </p:sp>
+      <p:pic>
+        <p:nvPicPr>
+          <p:cNvPr descr="" id="83" name=""/>
+          <p:cNvPicPr/>
+          <p:nvPr/>
+        </p:nvPicPr>
+        <p:blipFill>
+          <a:blip r:embed="rId1"/>
+          <a:stretch>
+            <a:fillRect/>
+          </a:stretch>
+        </p:blipFill>
+        <p:spPr>
+          <a:xfrm>
+            <a:off x="2664000" y="3816000"/>
+            <a:ext cx="1294560" cy="1195200"/>
+          </a:xfrm>
+          <a:prstGeom prst="rect">
+            <a:avLst/>
+          </a:prstGeom>
+        </p:spPr>
+      </p:pic>
     </p:spTree>
   </p:cSld>
 </p:sld>
@@ -1811,7 +2040,7 @@
       </p:grpSpPr>
       <p:sp>
         <p:nvSpPr>
-          <p:cNvPr id="41" name="TextShape 1"/>
+          <p:cNvPr id="43" name="TextShape 1"/>
           <p:cNvSpPr txBox="1"/>
           <p:nvPr/>
         </p:nvSpPr>
@@ -1830,15 +2059,15 @@
             <a:pPr algn="ctr"/>
             <a:r>
               <a:rPr lang="en-US" sz="2000"/>
-              <a:t>Things left to Resolve</a:t>
-            </a:r>
-            <a:endParaRPr/>
-          </a:p>
-        </p:txBody>
-      </p:sp>
-      <p:sp>
-        <p:nvSpPr>
-          <p:cNvPr id="42" name="TextShape 2"/>
+              <a:t>Contrast ANIMA and 6tisch</a:t>
+            </a:r>
+            <a:endParaRPr/>
+          </a:p>
+        </p:txBody>
+      </p:sp>
+      <p:sp>
+        <p:nvSpPr>
+          <p:cNvPr id="44" name="TextShape 2"/>
           <p:cNvSpPr txBox="1"/>
           <p:nvPr/>
         </p:nvSpPr>
@@ -1854,6 +2083,11 @@
         <p:txBody>
           <a:bodyPr bIns="0" lIns="0" rIns="0" tIns="0" wrap="none"/>
           <a:p>
+            <a:pPr>
+              <a:buSzPct val="45000"/>
+              <a:buFont typeface="StarSymbol"/>
+              <a:buChar char=""/>
+            </a:pPr>
             <a:r>
               <a:rPr lang="en-US" sz="2000"/>
               <a:t>Goal of ANIMA bootstrap is to create Enrollment over Secure Transport (RFC7030)</a:t>
@@ -1861,9 +2095,11 @@
             <a:endParaRPr/>
           </a:p>
           <a:p>
-            <a:endParaRPr/>
-          </a:p>
-          <a:p>
+            <a:pPr>
+              <a:buSzPct val="45000"/>
+              <a:buFont typeface="StarSymbol"/>
+              <a:buChar char=""/>
+            </a:pPr>
             <a:r>
               <a:rPr lang="en-US" sz="2000"/>
               <a:t>ANIMA accomodates HTTPS or DTLS/CoAP + Blockwise.  Hard sell to make DTLS Mandatory to Implement.</a:t>
@@ -1871,19 +2107,55 @@
             <a:endParaRPr/>
           </a:p>
           <a:p>
-            <a:endParaRPr/>
-          </a:p>
-          <a:p>
-            <a:endParaRPr/>
-          </a:p>
-          <a:p>
-            <a:endParaRPr/>
-          </a:p>
-        </p:txBody>
-      </p:sp>
-      <p:sp>
-        <p:nvSpPr>
-          <p:cNvPr id="43" name="TextShape 3"/>
+            <a:pPr>
+              <a:buSzPct val="45000"/>
+              <a:buFont typeface="StarSymbol"/>
+              <a:buChar char=""/>
+            </a:pPr>
+            <a:r>
+              <a:rPr lang="en-US" sz="2000"/>
+              <a:t>Network is not constrained</a:t>
+            </a:r>
+            <a:endParaRPr/>
+          </a:p>
+          <a:p>
+            <a:pPr lvl="1">
+              <a:buSzPct val="75000"/>
+              <a:buFont typeface="StarSymbol"/>
+              <a:buChar char=""/>
+            </a:pPr>
+            <a:r>
+              <a:rPr lang="en-US" sz="2000"/>
+              <a:t>After bootstrap, may be multi-gigabit</a:t>
+            </a:r>
+            <a:endParaRPr/>
+          </a:p>
+          <a:p>
+            <a:pPr>
+              <a:buSzPct val="45000"/>
+              <a:buFont typeface="StarSymbol"/>
+              <a:buChar char=""/>
+            </a:pPr>
+            <a:r>
+              <a:rPr lang="en-US" sz="2000"/>
+              <a:t>While device is not constrained in aggregate, ANIMA ACP code may run on control plane/line-card CPU: some hardware offload available, but not universal.</a:t>
+            </a:r>
+            <a:endParaRPr/>
+          </a:p>
+          <a:p>
+            <a:endParaRPr/>
+          </a:p>
+          <a:p>
+            <a:endParaRPr/>
+          </a:p>
+          <a:p>
+            <a:endParaRPr/>
+          </a:p>
+        </p:txBody>
+      </p:sp>
+      <p:sp>
+        <p:nvSpPr>
+          <p:cNvPr id="45" name="TextShape 3"/>
           <p:cNvSpPr txBox="1"/>
           <p:nvPr/>
         </p:nvSpPr>
@@ -1899,16 +2171,23 @@
         <p:txBody>
           <a:bodyPr bIns="0" lIns="0" rIns="0" tIns="0" wrap="none"/>
           <a:p>
-            <a:r>
-              <a:rPr lang="en-US" sz="2000"/>
-              <a:t>Goal of 6tisch bootstrap is to create secured CoAP/6top transport from JCE/PCE to new node</a:t>
-            </a:r>
-            <a:endParaRPr/>
-          </a:p>
-          <a:p>
-            <a:endParaRPr/>
-          </a:p>
-          <a:p>
+            <a:pPr>
+              <a:buSzPct val="45000"/>
+              <a:buFont typeface="StarSymbol"/>
+              <a:buChar char=""/>
+            </a:pPr>
+            <a:r>
+              <a:rPr lang="en-US" sz="2000"/>
+              <a:t>Goal of 6tisch bootstrap is to create secured CoAP/6top transport from JCE/PCE to new node to transport YANG.</a:t>
+            </a:r>
+            <a:endParaRPr/>
+          </a:p>
+          <a:p>
+            <a:pPr>
+              <a:buSzPct val="45000"/>
+              <a:buFont typeface="StarSymbol"/>
+              <a:buChar char=""/>
+            </a:pPr>
             <a:r>
               <a:rPr lang="en-US" sz="2000"/>
               <a:t>DTLS/CoAP only + 6top, blockwise may be controversial? </a:t>
@@ -1916,13 +2195,54 @@
             <a:endParaRPr/>
           </a:p>
           <a:p>
-            <a:endParaRPr/>
-          </a:p>
-        </p:txBody>
-      </p:sp>
-      <p:sp>
-        <p:nvSpPr>
-          <p:cNvPr id="44" name="TextShape 4"/>
+            <a:pPr>
+              <a:buSzPct val="45000"/>
+              <a:buFont typeface="StarSymbol"/>
+              <a:buChar char=""/>
+            </a:pPr>
+            <a:r>
+              <a:rPr lang="en-US" sz="2000"/>
+              <a:t>Network is constrained (not challenged)</a:t>
+            </a:r>
+            <a:endParaRPr/>
+          </a:p>
+          <a:p>
+            <a:pPr>
+              <a:buSzPct val="45000"/>
+              <a:buFont typeface="StarSymbol"/>
+              <a:buChar char=""/>
+            </a:pPr>
+            <a:r>
+              <a:rPr lang="en-US" sz="2000"/>
+              <a:t>Devices are very code and ram constrained.</a:t>
+            </a:r>
+            <a:endParaRPr/>
+          </a:p>
+          <a:p>
+            <a:pPr>
+              <a:buSzPct val="45000"/>
+              <a:buFont typeface="StarSymbol"/>
+              <a:buChar char=""/>
+            </a:pPr>
+            <a:r>
+              <a:rPr lang="en-US" sz="2000"/>
+              <a:t>Battery power is common (but not universal)</a:t>
+            </a:r>
+            <a:endParaRPr/>
+          </a:p>
+          <a:p>
+            <a:pPr>
+              <a:buSzPct val="45000"/>
+              <a:buFont typeface="StarSymbol"/>
+              <a:buChar char=""/>
+            </a:pPr>
+            <a:endParaRPr/>
+          </a:p>
+        </p:txBody>
+      </p:sp>
+      <p:sp>
+        <p:nvSpPr>
+          <p:cNvPr id="46" name="TextShape 4"/>
           <p:cNvSpPr txBox="1"/>
           <p:nvPr/>
         </p:nvSpPr>
@@ -1941,6 +2261,58 @@
             <a:r>
               <a:rPr lang="en-US"/>
               <a:t>VS</a:t>
+            </a:r>
+            <a:endParaRPr/>
+          </a:p>
+        </p:txBody>
+      </p:sp>
+      <p:sp>
+        <p:nvSpPr>
+          <p:cNvPr id="47" name="TextShape 5"/>
+          <p:cNvSpPr txBox="1"/>
+          <p:nvPr/>
+        </p:nvSpPr>
+        <p:spPr>
+          <a:xfrm>
+            <a:off x="1944000" y="6637680"/>
+            <a:ext cx="901440" cy="346320"/>
+          </a:xfrm>
+          <a:prstGeom prst="rect">
+            <a:avLst/>
+          </a:prstGeom>
+        </p:spPr>
+        <p:txBody>
+          <a:bodyPr bIns="45000" lIns="90000" rIns="90000" tIns="45000" wrap="none"/>
+          <a:p>
+            <a:r>
+              <a:rPr lang="en-US"/>
+              <a:t>ANIMA</a:t>
+            </a:r>
+            <a:endParaRPr/>
+          </a:p>
+        </p:txBody>
+      </p:sp>
+      <p:sp>
+        <p:nvSpPr>
+          <p:cNvPr id="48" name="TextShape 6"/>
+          <p:cNvSpPr txBox="1"/>
+          <p:nvPr/>
+        </p:nvSpPr>
+        <p:spPr>
+          <a:xfrm>
+            <a:off x="6840360" y="6637680"/>
+            <a:ext cx="776520" cy="346320"/>
+          </a:xfrm>
+          <a:prstGeom prst="rect">
+            <a:avLst/>
+          </a:prstGeom>
+        </p:spPr>
+        <p:txBody>
+          <a:bodyPr bIns="45000" lIns="90000" rIns="90000" tIns="45000" wrap="none"/>
+          <a:p>
+            <a:r>
+              <a:rPr lang="en-US"/>
+              <a:t>6tisch</a:t>
             </a:r>
             <a:endParaRPr/>
           </a:p>
@@ -1970,7 +2342,7 @@
       </p:grpSpPr>
       <p:sp>
         <p:nvSpPr>
-          <p:cNvPr id="45" name="TextShape 1"/>
+          <p:cNvPr id="49" name="TextShape 1"/>
           <p:cNvSpPr txBox="1"/>
           <p:nvPr/>
         </p:nvSpPr>
@@ -1988,23 +2360,23 @@
           <a:p>
             <a:pPr algn="ctr"/>
             <a:r>
-              <a:rPr lang="en-US"/>
-              <a:t>Join Problem</a:t>
-            </a:r>
-            <a:endParaRPr/>
-          </a:p>
-        </p:txBody>
-      </p:sp>
-      <p:sp>
-        <p:nvSpPr>
-          <p:cNvPr id="46" name="TextShape 2"/>
+              <a:rPr lang="en-US" sz="2000"/>
+              <a:t>Contrast ANIMA and NETCONF</a:t>
+            </a:r>
+            <a:endParaRPr/>
+          </a:p>
+        </p:txBody>
+      </p:sp>
+      <p:sp>
+        <p:nvSpPr>
+          <p:cNvPr id="50" name="TextShape 2"/>
           <p:cNvSpPr txBox="1"/>
           <p:nvPr/>
         </p:nvSpPr>
         <p:spPr>
           <a:xfrm>
             <a:off x="504000" y="1769040"/>
-            <a:ext cx="9071640" cy="4384080"/>
+            <a:ext cx="3875400" cy="4384080"/>
           </a:xfrm>
           <a:prstGeom prst="rect">
             <a:avLst/>
@@ -2013,65 +2385,14 @@
         <p:txBody>
           <a:bodyPr bIns="0" lIns="0" rIns="0" tIns="0" wrap="none"/>
           <a:p>
-            <a:r>
-              <a:rPr lang="en-US"/>
-              <a:t>How to let random uninitialized, “drop shipped”,  potentially malicious nodes into your network without destroying the network.</a:t>
-            </a:r>
-            <a:endParaRPr/>
-          </a:p>
-          <a:p>
             <a:pPr>
               <a:buSzPct val="45000"/>
               <a:buFont typeface="StarSymbol"/>
               <a:buChar char=""/>
             </a:pPr>
             <a:r>
-              <a:rPr lang="en-US" sz="2400"/>
-              <a:t>802.1x/EAP/PANA has this “solved” for initialized nodes which know which network they want to join; need to be pre-provisioned with certificates.</a:t>
-            </a:r>
-            <a:endParaRPr/>
-          </a:p>
-          <a:p>
-            <a:pPr lvl="1">
-              <a:buSzPct val="75000"/>
-              <a:buFont typeface="StarSymbol"/>
-              <a:buChar char=""/>
-            </a:pPr>
-            <a:r>
-              <a:rPr lang="en-US" sz="2000"/>
-              <a:t>needs EAP-TLS to make this work, which then includes new layers of fragmentation. This code is used once.</a:t>
-            </a:r>
-            <a:endParaRPr/>
-          </a:p>
-          <a:p>
-            <a:pPr lvl="1">
-              <a:buSzPct val="75000"/>
-              <a:buFont typeface="StarSymbol"/>
-              <a:buChar char=""/>
-            </a:pPr>
-            <a:r>
-              <a:rPr lang="en-US" sz="2000"/>
-              <a:t>PANA/1x authenticator function scales with number of nodes attempting to join, is subject to DoS attack, defending against may be too expensive for constrained nodes</a:t>
-            </a:r>
-            <a:endParaRPr/>
-          </a:p>
-          <a:p>
-            <a:pPr lvl="1">
-              <a:buSzPct val="75000"/>
-              <a:buFont typeface="StarSymbol"/>
-              <a:buChar char=""/>
-            </a:pPr>
-            <a:r>
-              <a:rPr lang="en-US" sz="2000"/>
-              <a:t>1x function for ANIMA </a:t>
-            </a:r>
-            <a:r>
-              <a:rPr b="1" lang="en-US" sz="2000"/>
-              <a:t>ACP</a:t>
-            </a:r>
-            <a:r>
-              <a:rPr lang="en-US" sz="2000"/>
-              <a:t> bootstrap may interfere with 1x function being provided by routers/switches for end-hosts!</a:t>
+              <a:rPr lang="en-US" sz="2000"/>
+              <a:t>Goal of ANIMA bootstrap is to create Enrollment over Secure Transport (RFC7030)</a:t>
             </a:r>
             <a:endParaRPr/>
           </a:p>
@@ -2083,14 +2404,292 @@
             </a:pPr>
             <a:r>
               <a:rPr lang="en-US" sz="2000"/>
-              <a:t>The goal is to provision new nodes with certificates, at which point “traditional” methods may be used to join network.</a:t>
-            </a:r>
-            <a:endParaRPr/>
-          </a:p>
-          <a:p>
-            <a:endParaRPr/>
-          </a:p>
-          <a:p>
+              <a:t>ANIMA accomodates HTTPS or DTLS/CoAP + Blockwise.  Hard sell to make DTLS Mandatory to Implement.</a:t>
+            </a:r>
+            <a:endParaRPr/>
+          </a:p>
+          <a:p>
+            <a:pPr>
+              <a:buSzPct val="45000"/>
+              <a:buFont typeface="StarSymbol"/>
+              <a:buChar char=""/>
+            </a:pPr>
+            <a:r>
+              <a:rPr lang="en-US" sz="2000"/>
+              <a:t>ANIMA replaces IDevID with LDevID ASAP.</a:t>
+            </a:r>
+            <a:endParaRPr/>
+          </a:p>
+          <a:p>
+            <a:pPr>
+              <a:buSzPct val="45000"/>
+              <a:buFont typeface="StarSymbol"/>
+              <a:buChar char=""/>
+            </a:pPr>
+            <a:r>
+              <a:rPr lang="en-US" sz="2000"/>
+              <a:t>ANIMA assumes link-local connectivity, device owner is link network operator</a:t>
+            </a:r>
+            <a:endParaRPr/>
+          </a:p>
+          <a:p>
+            <a:pPr>
+              <a:buSzPct val="45000"/>
+              <a:buFont typeface="StarSymbol"/>
+              <a:buChar char=""/>
+            </a:pPr>
+            <a:r>
+              <a:rPr lang="en-US" sz="2000"/>
+              <a:t>ANIMA tends to be for “infrastructure” </a:t>
+            </a:r>
+            <a:endParaRPr/>
+          </a:p>
+          <a:p>
+            <a:endParaRPr/>
+          </a:p>
+          <a:p>
+            <a:endParaRPr/>
+          </a:p>
+          <a:p>
+            <a:endParaRPr/>
+          </a:p>
+          <a:p>
+            <a:endParaRPr/>
+          </a:p>
+          <a:p>
+            <a:endParaRPr/>
+          </a:p>
+        </p:txBody>
+      </p:sp>
+      <p:sp>
+        <p:nvSpPr>
+          <p:cNvPr id="51" name="TextShape 3"/>
+          <p:cNvSpPr txBox="1"/>
+          <p:nvPr/>
+        </p:nvSpPr>
+        <p:spPr>
+          <a:xfrm>
+            <a:off x="5988240" y="1745640"/>
+            <a:ext cx="3659760" cy="4384080"/>
+          </a:xfrm>
+          <a:prstGeom prst="rect">
+            <a:avLst/>
+          </a:prstGeom>
+        </p:spPr>
+        <p:txBody>
+          <a:bodyPr bIns="0" lIns="0" rIns="0" tIns="0" wrap="none"/>
+          <a:p>
+            <a:pPr>
+              <a:buSzPct val="45000"/>
+              <a:buFont typeface="StarSymbol"/>
+              <a:buChar char=""/>
+            </a:pPr>
+            <a:r>
+              <a:rPr lang="en-US" sz="2000"/>
+              <a:t>Goal of NETCONF is to provide signed bootstrap data (YANG) to device.</a:t>
+            </a:r>
+            <a:endParaRPr/>
+          </a:p>
+          <a:p>
+            <a:pPr>
+              <a:buSzPct val="45000"/>
+              <a:buFont typeface="StarSymbol"/>
+              <a:buChar char=""/>
+            </a:pPr>
+            <a:r>
+              <a:rPr lang="en-US" sz="2000"/>
+              <a:t>Variety of sources: HTTP, HTTPS, DNS, mDNS, DHCP, removable storage...</a:t>
+            </a:r>
+            <a:endParaRPr/>
+          </a:p>
+          <a:p>
+            <a:pPr>
+              <a:buSzPct val="45000"/>
+              <a:buFont typeface="StarSymbol"/>
+              <a:buChar char=""/>
+            </a:pPr>
+            <a:r>
+              <a:rPr lang="en-US" sz="2000"/>
+              <a:t>NETCONF uses IDevID directly</a:t>
+            </a:r>
+            <a:endParaRPr/>
+          </a:p>
+          <a:p>
+            <a:pPr>
+              <a:buSzPct val="45000"/>
+              <a:buFont typeface="StarSymbol"/>
+              <a:buChar char=""/>
+            </a:pPr>
+            <a:r>
+              <a:rPr lang="en-US" sz="2000"/>
+              <a:t>NETCONF assumes device owner likely is not link operator, or operator is unsophisticated (home user)</a:t>
+            </a:r>
+            <a:endParaRPr/>
+          </a:p>
+          <a:p>
+            <a:pPr>
+              <a:buSzPct val="45000"/>
+              <a:buFont typeface="StarSymbol"/>
+              <a:buChar char=""/>
+            </a:pPr>
+            <a:r>
+              <a:rPr lang="en-US" sz="2000"/>
+              <a:t>NETCONF more appliance, and high-volume access device focused, rather than core infrastructure. </a:t>
+            </a:r>
+            <a:endParaRPr/>
+          </a:p>
+        </p:txBody>
+      </p:sp>
+      <p:sp>
+        <p:nvSpPr>
+          <p:cNvPr id="52" name="TextShape 4"/>
+          <p:cNvSpPr txBox="1"/>
+          <p:nvPr/>
+        </p:nvSpPr>
+        <p:spPr>
+          <a:xfrm>
+            <a:off x="4716000" y="2439360"/>
+            <a:ext cx="485640" cy="346320"/>
+          </a:xfrm>
+          <a:prstGeom prst="rect">
+            <a:avLst/>
+          </a:prstGeom>
+        </p:spPr>
+        <p:txBody>
+          <a:bodyPr bIns="45000" lIns="90000" rIns="90000" tIns="45000" wrap="none"/>
+          <a:p>
+            <a:r>
+              <a:rPr lang="en-US"/>
+              <a:t>VS</a:t>
+            </a:r>
+            <a:endParaRPr/>
+          </a:p>
+        </p:txBody>
+      </p:sp>
+      <p:sp>
+        <p:nvSpPr>
+          <p:cNvPr id="53" name="TextShape 5"/>
+          <p:cNvSpPr txBox="1"/>
+          <p:nvPr/>
+        </p:nvSpPr>
+        <p:spPr>
+          <a:xfrm>
+            <a:off x="1944000" y="6637680"/>
+            <a:ext cx="901440" cy="346320"/>
+          </a:xfrm>
+          <a:prstGeom prst="rect">
+            <a:avLst/>
+          </a:prstGeom>
+        </p:spPr>
+        <p:txBody>
+          <a:bodyPr bIns="45000" lIns="90000" rIns="90000" tIns="45000" wrap="none"/>
+          <a:p>
+            <a:r>
+              <a:rPr lang="en-US"/>
+              <a:t>ANIMA</a:t>
+            </a:r>
+            <a:endParaRPr/>
+          </a:p>
+        </p:txBody>
+      </p:sp>
+      <p:sp>
+        <p:nvSpPr>
+          <p:cNvPr id="54" name="TextShape 6"/>
+          <p:cNvSpPr txBox="1"/>
+          <p:nvPr/>
+        </p:nvSpPr>
+        <p:spPr>
+          <a:xfrm>
+            <a:off x="6840000" y="6637680"/>
+            <a:ext cx="1287000" cy="346320"/>
+          </a:xfrm>
+          <a:prstGeom prst="rect">
+            <a:avLst/>
+          </a:prstGeom>
+        </p:spPr>
+        <p:txBody>
+          <a:bodyPr bIns="45000" lIns="90000" rIns="90000" tIns="45000" wrap="none"/>
+          <a:p>
+            <a:r>
+              <a:rPr lang="en-US"/>
+              <a:t>NETCONF</a:t>
+            </a:r>
+            <a:endParaRPr/>
+          </a:p>
+        </p:txBody>
+      </p:sp>
+      <p:sp>
+        <p:nvSpPr>
+          <p:cNvPr id="55" name="CustomShape 7"/>
+          <p:cNvSpPr/>
+          <p:nvPr/>
+        </p:nvSpPr>
+        <p:spPr>
+          <a:xfrm>
+            <a:off x="3600000" y="6336000"/>
+            <a:ext cx="2304000" cy="576000"/>
+          </a:xfrm>
+          <a:prstGeom prst="wedgeEllipseCallout">
+            <a:avLst>
+              <a:gd fmla="val -5152" name="adj1"/>
+              <a:gd fmla="val -24109" name="adj2"/>
+            </a:avLst>
+          </a:prstGeom>
+          <a:solidFill>
+            <a:srgbClr val="aecf00"/>
+          </a:solidFill>
+          <a:ln>
+            <a:solidFill>
+              <a:srgbClr val="808080"/>
+            </a:solidFill>
+          </a:ln>
+        </p:spPr>
+        <p:txBody>
+          <a:bodyPr anchor="ctr" bIns="45000" lIns="90000" rIns="90000" tIns="45000" wrap="none"/>
+          <a:p>
+            <a:pPr algn="ctr"/>
+            <a:r>
+              <a:rPr lang="en-US"/>
+              <a:t>Wild generalization!</a:t>
+            </a:r>
+            <a:endParaRPr/>
+          </a:p>
+        </p:txBody>
+      </p:sp>
+      <p:sp>
+        <p:nvSpPr>
+          <p:cNvPr id="56" name="CustomShape 8"/>
+          <p:cNvSpPr/>
+          <p:nvPr/>
+        </p:nvSpPr>
+        <p:spPr>
+          <a:xfrm>
+            <a:off x="3600000" y="6336000"/>
+            <a:ext cx="2304000" cy="576000"/>
+          </a:xfrm>
+          <a:prstGeom prst="wedgeEllipseCallout">
+            <a:avLst>
+              <a:gd fmla="val 24610" name="adj1"/>
+              <a:gd fmla="val -29222" name="adj2"/>
+            </a:avLst>
+          </a:prstGeom>
+          <a:solidFill>
+            <a:srgbClr val="aecf00"/>
+          </a:solidFill>
+          <a:ln>
+            <a:solidFill>
+              <a:srgbClr val="808080"/>
+            </a:solidFill>
+          </a:ln>
+        </p:spPr>
+        <p:txBody>
+          <a:bodyPr anchor="ctr" bIns="45000" lIns="90000" rIns="90000" tIns="45000" wrap="none"/>
+          <a:p>
+            <a:pPr algn="ctr"/>
+            <a:r>
+              <a:rPr lang="en-US"/>
+              <a:t>Wild generalization!</a:t>
+            </a:r>
             <a:endParaRPr/>
           </a:p>
         </p:txBody>
@@ -2148,7 +2747,7 @@
       </p:grpSpPr>
       <p:sp>
         <p:nvSpPr>
-          <p:cNvPr id="47" name="TextShape 1"/>
+          <p:cNvPr id="57" name="TextShape 1"/>
           <p:cNvSpPr txBox="1"/>
           <p:nvPr/>
         </p:nvSpPr>
@@ -2166,23 +2765,220 @@
           <a:p>
             <a:pPr algn="ctr"/>
             <a:r>
-              <a:rPr lang="en-US"/>
-              <a:t>Network Diagram</a:t>
-            </a:r>
-            <a:endParaRPr/>
-          </a:p>
-        </p:txBody>
-      </p:sp>
-      <p:sp>
-        <p:nvSpPr>
-          <p:cNvPr id="48" name="TextShape 2"/>
+              <a:rPr lang="en-US" sz="2000"/>
+              <a:t>Contrast 6tisch and NETCONF!</a:t>
+            </a:r>
+            <a:endParaRPr/>
+          </a:p>
+        </p:txBody>
+      </p:sp>
+      <p:sp>
+        <p:nvSpPr>
+          <p:cNvPr id="58" name="TextShape 2"/>
           <p:cNvSpPr txBox="1"/>
           <p:nvPr/>
         </p:nvSpPr>
         <p:spPr>
           <a:xfrm>
-            <a:off x="465480" y="5472000"/>
-            <a:ext cx="8246520" cy="858240"/>
+            <a:off x="504000" y="1769040"/>
+            <a:ext cx="3875400" cy="4384080"/>
+          </a:xfrm>
+          <a:prstGeom prst="rect">
+            <a:avLst/>
+          </a:prstGeom>
+        </p:spPr>
+        <p:txBody>
+          <a:bodyPr bIns="0" lIns="0" rIns="0" tIns="0" wrap="none"/>
+          <a:p>
+            <a:pPr>
+              <a:buSzPct val="45000"/>
+              <a:buFont typeface="StarSymbol"/>
+              <a:buChar char=""/>
+            </a:pPr>
+            <a:r>
+              <a:rPr lang="en-US" sz="2000"/>
+              <a:t>Goal of 6tisch bootstrap is to create secured CoAP/6top transport from JCE/PCE to new node to transport </a:t>
+            </a:r>
+            <a:r>
+              <a:rPr lang="en-US" sz="2000">
+                <a:solidFill>
+                  <a:srgbClr val="dc2300"/>
+                </a:solidFill>
+              </a:rPr>
+              <a:t>YANG</a:t>
+            </a:r>
+            <a:r>
+              <a:rPr lang="en-US" sz="2000"/>
+              <a:t>.</a:t>
+            </a:r>
+            <a:endParaRPr/>
+          </a:p>
+          <a:p>
+            <a:pPr>
+              <a:buSzPct val="45000"/>
+              <a:buFont typeface="StarSymbol"/>
+              <a:buChar char=""/>
+            </a:pPr>
+            <a:r>
+              <a:rPr lang="en-US" sz="2000"/>
+              <a:t>Devices and networks constrainted.</a:t>
+            </a:r>
+            <a:endParaRPr/>
+          </a:p>
+          <a:p>
+            <a:pPr>
+              <a:buSzPct val="45000"/>
+              <a:buFont typeface="StarSymbol"/>
+              <a:buChar char=""/>
+            </a:pPr>
+            <a:r>
+              <a:rPr lang="en-US" sz="2000"/>
+              <a:t>6tisch will replace IDevID with LDevID for use with 802.15.9 or other per-link KMP</a:t>
+            </a:r>
+            <a:endParaRPr/>
+          </a:p>
+          <a:p>
+            <a:pPr>
+              <a:buSzPct val="45000"/>
+              <a:buFont typeface="StarSymbol"/>
+              <a:buChar char=""/>
+            </a:pPr>
+            <a:r>
+              <a:rPr lang="en-US" sz="2000"/>
+              <a:t>No cheap broadcast/multicast, or service discovery</a:t>
+            </a:r>
+            <a:endParaRPr/>
+          </a:p>
+          <a:p>
+            <a:pPr>
+              <a:buSzPct val="45000"/>
+              <a:buFont typeface="StarSymbol"/>
+              <a:buChar char=""/>
+            </a:pPr>
+            <a:r>
+              <a:rPr lang="en-US" sz="2000"/>
+              <a:t>Device owner is network owner.</a:t>
+            </a:r>
+            <a:endParaRPr/>
+          </a:p>
+          <a:p>
+            <a:endParaRPr/>
+          </a:p>
+          <a:p>
+            <a:endParaRPr/>
+          </a:p>
+          <a:p>
+            <a:endParaRPr/>
+          </a:p>
+          <a:p>
+            <a:endParaRPr/>
+          </a:p>
+          <a:p>
+            <a:endParaRPr/>
+          </a:p>
+        </p:txBody>
+      </p:sp>
+      <p:sp>
+        <p:nvSpPr>
+          <p:cNvPr id="59" name="TextShape 3"/>
+          <p:cNvSpPr txBox="1"/>
+          <p:nvPr/>
+        </p:nvSpPr>
+        <p:spPr>
+          <a:xfrm>
+            <a:off x="5988240" y="1745640"/>
+            <a:ext cx="3659760" cy="4384080"/>
+          </a:xfrm>
+          <a:prstGeom prst="rect">
+            <a:avLst/>
+          </a:prstGeom>
+        </p:spPr>
+        <p:txBody>
+          <a:bodyPr bIns="0" lIns="0" rIns="0" tIns="0" wrap="none"/>
+          <a:p>
+            <a:pPr>
+              <a:buSzPct val="45000"/>
+              <a:buFont typeface="StarSymbol"/>
+              <a:buChar char=""/>
+            </a:pPr>
+            <a:r>
+              <a:rPr lang="en-US" sz="2000"/>
+              <a:t>Goal of NETCONF is to provide signed bootstrap data (</a:t>
+            </a:r>
+            <a:r>
+              <a:rPr lang="en-US" sz="2000">
+                <a:solidFill>
+                  <a:srgbClr val="dc2300"/>
+                </a:solidFill>
+              </a:rPr>
+              <a:t>YANG</a:t>
+            </a:r>
+            <a:r>
+              <a:rPr lang="en-US" sz="2000"/>
+              <a:t>) to device.</a:t>
+            </a:r>
+            <a:endParaRPr/>
+          </a:p>
+          <a:p>
+            <a:pPr>
+              <a:buSzPct val="45000"/>
+              <a:buFont typeface="StarSymbol"/>
+              <a:buChar char=""/>
+            </a:pPr>
+            <a:r>
+              <a:rPr lang="en-US" sz="2000"/>
+              <a:t>Variety of sources: HTTP, HTTPS, DNS, mDNS, DHCP, removable storage...</a:t>
+            </a:r>
+            <a:endParaRPr/>
+          </a:p>
+          <a:p>
+            <a:pPr>
+              <a:buSzPct val="45000"/>
+              <a:buFont typeface="StarSymbol"/>
+              <a:buChar char=""/>
+            </a:pPr>
+            <a:r>
+              <a:rPr lang="en-US" sz="2000"/>
+              <a:t>NETCONF uses IDevID directly</a:t>
+            </a:r>
+            <a:endParaRPr/>
+          </a:p>
+          <a:p>
+            <a:pPr>
+              <a:buSzPct val="45000"/>
+              <a:buFont typeface="StarSymbol"/>
+              <a:buChar char=""/>
+            </a:pPr>
+            <a:r>
+              <a:rPr lang="en-US" sz="2000"/>
+              <a:t>NETCONF assumes device owner likely is not link operator, or operator is unsophisticated (home user)</a:t>
+            </a:r>
+            <a:endParaRPr/>
+          </a:p>
+          <a:p>
+            <a:pPr>
+              <a:buSzPct val="45000"/>
+              <a:buFont typeface="StarSymbol"/>
+              <a:buChar char=""/>
+            </a:pPr>
+            <a:r>
+              <a:rPr lang="en-US" sz="2000"/>
+              <a:t>NETCONF more appliance, and high-volume access device focused </a:t>
+            </a:r>
+            <a:endParaRPr/>
+          </a:p>
+        </p:txBody>
+      </p:sp>
+      <p:sp>
+        <p:nvSpPr>
+          <p:cNvPr id="60" name="TextShape 4"/>
+          <p:cNvSpPr txBox="1"/>
+          <p:nvPr/>
+        </p:nvSpPr>
+        <p:spPr>
+          <a:xfrm>
+            <a:off x="4716000" y="2439360"/>
+            <a:ext cx="485640" cy="346320"/>
           </a:xfrm>
           <a:prstGeom prst="rect">
             <a:avLst/>
@@ -2193,7 +2989,59 @@
           <a:p>
             <a:r>
               <a:rPr lang="en-US"/>
-              <a:t>Both 6tisch/LLN and ANIMA share Manufacturer Installed Certificates (“MIC”), and have a supply chain relationship with network operator via which Ownership Vouchers can be communicated.</a:t>
+              <a:t>VS</a:t>
+            </a:r>
+            <a:endParaRPr/>
+          </a:p>
+        </p:txBody>
+      </p:sp>
+      <p:sp>
+        <p:nvSpPr>
+          <p:cNvPr id="61" name="TextShape 5"/>
+          <p:cNvSpPr txBox="1"/>
+          <p:nvPr/>
+        </p:nvSpPr>
+        <p:spPr>
+          <a:xfrm>
+            <a:off x="1944000" y="6637680"/>
+            <a:ext cx="901440" cy="346320"/>
+          </a:xfrm>
+          <a:prstGeom prst="rect">
+            <a:avLst/>
+          </a:prstGeom>
+        </p:spPr>
+        <p:txBody>
+          <a:bodyPr bIns="45000" lIns="90000" rIns="90000" tIns="45000" wrap="none"/>
+          <a:p>
+            <a:r>
+              <a:rPr lang="en-US"/>
+              <a:t>ANIMA</a:t>
+            </a:r>
+            <a:endParaRPr/>
+          </a:p>
+        </p:txBody>
+      </p:sp>
+      <p:sp>
+        <p:nvSpPr>
+          <p:cNvPr id="62" name="TextShape 6"/>
+          <p:cNvSpPr txBox="1"/>
+          <p:nvPr/>
+        </p:nvSpPr>
+        <p:spPr>
+          <a:xfrm>
+            <a:off x="6840000" y="6637680"/>
+            <a:ext cx="1287000" cy="346320"/>
+          </a:xfrm>
+          <a:prstGeom prst="rect">
+            <a:avLst/>
+          </a:prstGeom>
+        </p:spPr>
+        <p:txBody>
+          <a:bodyPr bIns="45000" lIns="90000" rIns="90000" tIns="45000" wrap="none"/>
+          <a:p>
+            <a:r>
+              <a:rPr lang="en-US"/>
+              <a:t>NETCONF</a:t>
             </a:r>
             <a:endParaRPr/>
           </a:p>
@@ -2201,6 +3049,35 @@
       </p:sp>
     </p:spTree>
   </p:cSld>
+  <p:timing>
+    <p:tnLst>
+      <p:par>
+        <p:cTn dur="indefinite" id="3" nodeType="tmRoot" restart="never">
+          <p:childTnLst>
+            <p:seq>
+              <p:cTn id="4" nodeType="mainSeq">
+                <p:childTnLst/>
+              </p:cTn>
+              <p:prevCondLst>
+                <p:cond delay="0" evt="onPrev">
+                  <p:tgtEl>
+                    <p:sldTgt/>
+                  </p:tgtEl>
+                </p:cond>
+              </p:prevCondLst>
+              <p:nextCondLst>
+                <p:cond delay="0" evt="onNext">
+                  <p:tgtEl>
+                    <p:sldTgt/>
+                  </p:tgtEl>
+                </p:cond>
+              </p:nextCondLst>
+            </p:seq>
+          </p:childTnLst>
+        </p:cTn>
+      </p:par>
+    </p:tnLst>
+  </p:timing>
 </p:sld>
 </file>
 
@@ -2223,7 +3100,7 @@
       </p:grpSpPr>
       <p:sp>
         <p:nvSpPr>
-          <p:cNvPr id="49" name="TextShape 1"/>
+          <p:cNvPr id="63" name="TextShape 1"/>
           <p:cNvSpPr txBox="1"/>
           <p:nvPr/>
         </p:nvSpPr>
@@ -2241,23 +3118,23 @@
           <a:p>
             <a:pPr algn="ctr"/>
             <a:r>
-              <a:rPr lang="en-US" sz="3600"/>
-              <a:t>New Node /Registrar communications</a:t>
-            </a:r>
-            <a:endParaRPr/>
-          </a:p>
-        </p:txBody>
-      </p:sp>
-      <p:sp>
-        <p:nvSpPr>
-          <p:cNvPr id="50" name="TextShape 2"/>
+              <a:rPr lang="en-US"/>
+              <a:t>Join Problem</a:t>
+            </a:r>
+            <a:endParaRPr/>
+          </a:p>
+        </p:txBody>
+      </p:sp>
+      <p:sp>
+        <p:nvSpPr>
+          <p:cNvPr id="64" name="TextShape 2"/>
           <p:cNvSpPr txBox="1"/>
           <p:nvPr/>
         </p:nvSpPr>
         <p:spPr>
           <a:xfrm>
             <a:off x="504000" y="1769040"/>
-            <a:ext cx="4426920" cy="4384080"/>
+            <a:ext cx="9071640" cy="4384080"/>
           </a:xfrm>
           <a:prstGeom prst="rect">
             <a:avLst/>
@@ -2266,26 +3143,21 @@
         <p:txBody>
           <a:bodyPr bIns="0" lIns="0" rIns="0" tIns="0" wrap="none"/>
           <a:p>
+            <a:r>
+              <a:rPr lang="en-US"/>
+              <a:t>How to let random uninitialized, “drop shipped”,  potentially malicious nodes into your network without destroying the network.</a:t>
+            </a:r>
+            <a:endParaRPr/>
+          </a:p>
+          <a:p>
             <a:pPr>
               <a:buSzPct val="45000"/>
               <a:buFont typeface="StarSymbol"/>
               <a:buChar char=""/>
             </a:pPr>
             <a:r>
-              <a:rPr lang="en-US"/>
-              <a:t>New Node ↔ Proxy use Link Local addresses.</a:t>
-            </a:r>
-            <a:endParaRPr/>
-          </a:p>
-          <a:p>
-            <a:pPr>
-              <a:buSzPct val="45000"/>
-              <a:buFont typeface="StarSymbol"/>
-              <a:buChar char=""/>
-            </a:pPr>
-            <a:r>
-              <a:rPr lang="en-US"/>
-              <a:t>Communication is CoAP/DTLS over UDP</a:t>
+              <a:rPr lang="en-US" sz="2400"/>
+              <a:t>802.1x/EAP/PANA has this “solved” for initialized nodes which know which network they want to join; need to be pre-provisioned with certificates.</a:t>
             </a:r>
             <a:endParaRPr/>
           </a:p>
@@ -2296,20 +3168,8 @@
               <a:buChar char=""/>
             </a:pPr>
             <a:r>
-              <a:rPr lang="en-US" sz="1300"/>
-              <a:t>(or HTTPS/TCP)</a:t>
-            </a:r>
-            <a:endParaRPr/>
-          </a:p>
-          <a:p>
-            <a:pPr>
-              <a:buSzPct val="45000"/>
-              <a:buFont typeface="StarSymbol"/>
-              <a:buChar char=""/>
-            </a:pPr>
-            <a:r>
-              <a:rPr lang="en-US"/>
-              <a:t>Proxy ↔ Registrar communication is forwarded (D)TLS traffic; proxy is uninvolved in security. </a:t>
+              <a:rPr lang="en-US" sz="2000"/>
+              <a:t>needs EAP-TLS to make this work, which then includes new layers of fragmentation. This code is used once.</a:t>
             </a:r>
             <a:endParaRPr/>
           </a:p>
@@ -2320,8 +3180,28 @@
               <a:buChar char=""/>
             </a:pPr>
             <a:r>
-              <a:rPr lang="en-US" sz="1300"/>
-              <a:t>Proxy is neither trusted, nor needs to be truthworthy</a:t>
+              <a:rPr lang="en-US" sz="2000"/>
+              <a:t>PANA/1x authenticator function scales with number of nodes attempting to join, is subject to DoS attack, defending against may be too expensive for constrained nodes</a:t>
+            </a:r>
+            <a:endParaRPr/>
+          </a:p>
+          <a:p>
+            <a:pPr lvl="1">
+              <a:buSzPct val="75000"/>
+              <a:buFont typeface="StarSymbol"/>
+              <a:buChar char=""/>
+            </a:pPr>
+            <a:r>
+              <a:rPr lang="en-US" sz="2000"/>
+              <a:t>1x function for ANIMA </a:t>
+            </a:r>
+            <a:r>
+              <a:rPr b="1" lang="en-US" sz="2000"/>
+              <a:t>ACP</a:t>
+            </a:r>
+            <a:r>
+              <a:rPr lang="en-US" sz="2000"/>
+              <a:t> bootstrap may interfere with 1x function being provided by routers/switches for end-hosts!</a:t>
             </a:r>
             <a:endParaRPr/>
           </a:p>
@@ -2332,9 +3212,15 @@
               <a:buChar char=""/>
             </a:pPr>
             <a:r>
-              <a:rPr lang="en-US" sz="1300"/>
-              <a:t>Green Encapsulation arrow can be implemented in different ways</a:t>
-            </a:r>
+              <a:rPr lang="en-US" sz="2000"/>
+              <a:t>The goal is to provision new nodes with certificates, at which point “traditional” methods may be used to join network.</a:t>
+            </a:r>
+            <a:endParaRPr/>
+          </a:p>
+          <a:p>
+            <a:endParaRPr/>
+          </a:p>
+          <a:p>
             <a:endParaRPr/>
           </a:p>
         </p:txBody>
@@ -2363,7 +3249,7 @@
       </p:grpSpPr>
       <p:sp>
         <p:nvSpPr>
-          <p:cNvPr id="51" name="TextShape 1"/>
+          <p:cNvPr id="65" name="TextShape 1"/>
           <p:cNvSpPr txBox="1"/>
           <p:nvPr/>
         </p:nvSpPr>
@@ -2382,167 +3268,74 @@
             <a:pPr algn="ctr"/>
             <a:r>
               <a:rPr lang="en-US"/>
-              <a:t>Proxy/Join Assistant proxy methods</a:t>
-            </a:r>
-            <a:endParaRPr/>
-          </a:p>
-        </p:txBody>
-      </p:sp>
-      <p:sp>
-        <p:nvSpPr>
-          <p:cNvPr id="52" name="TextShape 2"/>
+              <a:t>Network Diagram</a:t>
+            </a:r>
+            <a:endParaRPr/>
+          </a:p>
+        </p:txBody>
+      </p:sp>
+      <p:sp>
+        <p:nvSpPr>
+          <p:cNvPr id="66" name="TextShape 2"/>
           <p:cNvSpPr txBox="1"/>
           <p:nvPr/>
         </p:nvSpPr>
         <p:spPr>
           <a:xfrm>
-            <a:off x="504000" y="1769040"/>
-            <a:ext cx="4426920" cy="4384080"/>
-          </a:xfrm>
-          <a:prstGeom prst="rect">
-            <a:avLst/>
-          </a:prstGeom>
-        </p:spPr>
-        <p:txBody>
-          <a:bodyPr bIns="0" lIns="0" rIns="0" tIns="0" wrap="none"/>
-          <a:p>
-            <a:r>
-              <a:rPr lang="en-US"/>
-              <a:t>HTTPS</a:t>
-            </a:r>
-            <a:endParaRPr/>
-          </a:p>
-          <a:p>
-            <a:pPr lvl="1">
-              <a:buFont typeface="StarSymbol"/>
-              <a:buAutoNum type="arabicPeriod"/>
-            </a:pPr>
-            <a:r>
-              <a:rPr lang="en-US"/>
-              <a:t>Via circuit proxy (process per connection), or HTTP proxy.</a:t>
-            </a:r>
-            <a:endParaRPr/>
-          </a:p>
-          <a:p>
-            <a:pPr lvl="1">
-              <a:buFont typeface="StarSymbol"/>
-              <a:buAutoNum type="arabicPeriod"/>
-            </a:pPr>
-            <a:r>
-              <a:rPr lang="en-US"/>
-              <a:t>Via NAT66 of link-layer enrollment addresses to ACP ULA address </a:t>
-            </a:r>
-            <a:endParaRPr/>
-          </a:p>
-          <a:p>
-            <a:pPr lvl="1">
-              <a:buFont typeface="StarSymbol"/>
-              <a:buAutoNum type="arabicPeriod"/>
-            </a:pPr>
-            <a:r>
-              <a:rPr lang="en-US"/>
-              <a:t>Stateless IPIP encapsulation of link-local traffic to registar</a:t>
-            </a:r>
-            <a:endParaRPr/>
-          </a:p>
-        </p:txBody>
-      </p:sp>
-      <p:sp>
-        <p:nvSpPr>
-          <p:cNvPr id="53" name="TextShape 3"/>
+            <a:off x="465480" y="5472000"/>
+            <a:ext cx="8246520" cy="858240"/>
+          </a:xfrm>
+          <a:prstGeom prst="rect">
+            <a:avLst/>
+          </a:prstGeom>
+        </p:spPr>
+        <p:txBody>
+          <a:bodyPr bIns="45000" lIns="90000" rIns="90000" tIns="45000" wrap="none"/>
+          <a:p>
+            <a:r>
+              <a:rPr lang="en-US"/>
+              <a:t>Both 6tisch/LLN, ANIMA and NETCONF share Manufacturer Installed Certificates (“MIC”) [IDevID], and have a supply chain relationship with network operator via which Ownership Vouchers can be communicated.</a:t>
+            </a:r>
+            <a:endParaRPr/>
+          </a:p>
+        </p:txBody>
+      </p:sp>
+      <p:sp>
+        <p:nvSpPr>
+          <p:cNvPr id="67" name="TextShape 3"/>
           <p:cNvSpPr txBox="1"/>
           <p:nvPr/>
         </p:nvSpPr>
         <p:spPr>
           <a:xfrm>
-            <a:off x="5152680" y="1769040"/>
-            <a:ext cx="4426920" cy="4384080"/>
-          </a:xfrm>
-          <a:prstGeom prst="rect">
-            <a:avLst/>
-          </a:prstGeom>
-        </p:spPr>
-        <p:txBody>
-          <a:bodyPr bIns="0" lIns="0" rIns="0" tIns="0" wrap="none"/>
-          <a:p>
-            <a:r>
-              <a:rPr lang="en-US"/>
-              <a:t>CoAP/DTLS</a:t>
-            </a:r>
-            <a:endParaRPr/>
-          </a:p>
-          <a:p>
-            <a:pPr>
-              <a:buFont typeface="StarSymbol"/>
-              <a:buAutoNum type="arabicPeriod"/>
-            </a:pPr>
-            <a:r>
-              <a:rPr lang="en-US"/>
-              <a:t> </a:t>
-            </a:r>
-            <a:r>
-              <a:rPr lang="en-US"/>
-              <a:t>UDP circuit proxy</a:t>
-            </a:r>
-            <a:endParaRPr/>
-          </a:p>
-          <a:p>
-            <a:pPr>
-              <a:buFont typeface="StarSymbol"/>
-              <a:buAutoNum type="arabicPeriod"/>
-            </a:pPr>
-            <a:r>
-              <a:rPr lang="en-US"/>
-              <a:t> </a:t>
-            </a:r>
-            <a:r>
-              <a:rPr lang="en-US"/>
-              <a:t>NAT66 of link-layer to ACP ULA address</a:t>
-            </a:r>
-            <a:endParaRPr/>
-          </a:p>
-          <a:p>
-            <a:pPr>
-              <a:buFont typeface="StarSymbol"/>
-              <a:buAutoNum type="arabicPeriod"/>
-            </a:pPr>
-            <a:r>
-              <a:rPr lang="en-US"/>
-              <a:t> </a:t>
-            </a:r>
-            <a:r>
-              <a:rPr lang="en-US"/>
-              <a:t>Stateless IPIP encapsulation of link-local traffic to registrar</a:t>
-            </a:r>
-            <a:endParaRPr/>
-          </a:p>
-          <a:p>
-            <a:pPr lvl="1">
-              <a:buFont typeface="StarSymbol"/>
-              <a:buAutoNum type="alphaLcParenR"/>
-            </a:pPr>
-            <a:r>
-              <a:rPr lang="en-US"/>
-              <a:t> </a:t>
-            </a:r>
-            <a:r>
-              <a:rPr lang="en-US"/>
-              <a:t>Essentially this is routing-dispatch IPIP encapsulation</a:t>
-            </a:r>
-            <a:endParaRPr/>
-          </a:p>
-        </p:txBody>
-      </p:sp>
-      <p:sp>
-        <p:nvSpPr>
-          <p:cNvPr id="54" name="TextShape 4"/>
+            <a:off x="1008000" y="1656000"/>
+            <a:ext cx="776520" cy="346320"/>
+          </a:xfrm>
+          <a:prstGeom prst="rect">
+            <a:avLst/>
+          </a:prstGeom>
+        </p:spPr>
+        <p:txBody>
+          <a:bodyPr bIns="45000" lIns="90000" rIns="90000" tIns="45000" wrap="none"/>
+          <a:p>
+            <a:r>
+              <a:rPr lang="en-US"/>
+              <a:t>6tisch</a:t>
+            </a:r>
+            <a:endParaRPr/>
+          </a:p>
+        </p:txBody>
+      </p:sp>
+      <p:sp>
+        <p:nvSpPr>
+          <p:cNvPr id="68" name="TextShape 4"/>
           <p:cNvSpPr txBox="1"/>
           <p:nvPr/>
         </p:nvSpPr>
         <p:spPr>
           <a:xfrm>
-            <a:off x="673920" y="6853680"/>
-            <a:ext cx="8479440" cy="858240"/>
+            <a:off x="9087480" y="1165680"/>
+            <a:ext cx="901440" cy="346320"/>
           </a:xfrm>
           <a:prstGeom prst="rect">
             <a:avLst/>
@@ -2553,196 +3346,7 @@
           <a:p>
             <a:r>
               <a:rPr lang="en-US"/>
-              <a:t>See draft-richardson-anima-state-for-joinrouter-00: Considerations for stateful vs stateless join router in ANIMA bootstrap, for longer discussion</a:t>
-            </a:r>
-            <a:endParaRPr/>
-          </a:p>
-          <a:p>
-            <a:r>
-              <a:rPr lang="en-US"/>
-              <a:t>             </a:t>
-            </a:r>
-            <a:endParaRPr/>
-          </a:p>
-        </p:txBody>
-      </p:sp>
-      <p:pic>
-        <p:nvPicPr>
-          <p:cNvPr descr="" id="55" name=""/>
-          <p:cNvPicPr/>
-          <p:nvPr/>
-        </p:nvPicPr>
-        <p:blipFill>
-          <a:blip r:embed="rId1"/>
-          <a:stretch>
-            <a:fillRect/>
-          </a:stretch>
-        </p:blipFill>
-        <p:spPr>
-          <a:xfrm>
-            <a:off x="399240" y="3070440"/>
-            <a:ext cx="447120" cy="542880"/>
-          </a:xfrm>
-          <a:prstGeom prst="rect">
-            <a:avLst/>
-          </a:prstGeom>
-        </p:spPr>
-      </p:pic>
-      <p:pic>
-        <p:nvPicPr>
-          <p:cNvPr descr="" id="56" name=""/>
-          <p:cNvPicPr/>
-          <p:nvPr/>
-        </p:nvPicPr>
-        <p:blipFill>
-          <a:blip r:embed="rId2"/>
-          <a:stretch>
-            <a:fillRect/>
-          </a:stretch>
-        </p:blipFill>
-        <p:spPr>
-          <a:xfrm>
-            <a:off x="4618440" y="3888360"/>
-            <a:ext cx="534240" cy="471600"/>
-          </a:xfrm>
-          <a:prstGeom prst="rect">
-            <a:avLst/>
-          </a:prstGeom>
-        </p:spPr>
-      </p:pic>
-      <p:pic>
-        <p:nvPicPr>
-          <p:cNvPr descr="" id="57" name=""/>
-          <p:cNvPicPr/>
-          <p:nvPr/>
-        </p:nvPicPr>
-        <p:blipFill>
-          <a:blip r:embed="rId3"/>
-          <a:stretch>
-            <a:fillRect/>
-          </a:stretch>
-        </p:blipFill>
-        <p:spPr>
-          <a:xfrm>
-            <a:off x="4556880" y="2445480"/>
-            <a:ext cx="433080" cy="399960"/>
-          </a:xfrm>
-          <a:prstGeom prst="rect">
-            <a:avLst/>
-          </a:prstGeom>
-        </p:spPr>
-      </p:pic>
-      <p:sp>
-        <p:nvSpPr>
-          <p:cNvPr id="58" name="CustomShape 5"/>
-          <p:cNvSpPr/>
-          <p:nvPr/>
-        </p:nvSpPr>
-        <p:spPr>
-          <a:xfrm>
-            <a:off x="139320" y="5180400"/>
-            <a:ext cx="3101400" cy="1567080"/>
-          </a:xfrm>
-          <a:prstGeom prst="cloudCallout">
-            <a:avLst>
-              <a:gd fmla="val 3401" name="adj1"/>
-              <a:gd fmla="val -23683" name="adj2"/>
-            </a:avLst>
-          </a:prstGeom>
-          <a:solidFill>
-            <a:srgbClr val="cfe7f5"/>
-          </a:solidFill>
-          <a:ln>
-            <a:solidFill>
-              <a:srgbClr val="808080"/>
-            </a:solidFill>
-          </a:ln>
-        </p:spPr>
-        <p:txBody>
-          <a:bodyPr anchor="ctr" bIns="45000" lIns="90000" rIns="90000" tIns="45000" wrap="none"/>
-          <a:p>
-            <a:pPr algn="ctr"/>
-            <a:r>
-              <a:rPr lang="en-US"/>
-              <a:t>Brian Carpenter </a:t>
-            </a:r>
-            <a:endParaRPr/>
-          </a:p>
-          <a:p>
-            <a:pPr algn="ctr"/>
-            <a:r>
-              <a:rPr lang="en-US"/>
-              <a:t>was visibly ill</a:t>
-            </a:r>
-            <a:endParaRPr/>
-          </a:p>
-        </p:txBody>
-      </p:sp>
-      <p:sp>
-        <p:nvSpPr>
-          <p:cNvPr id="59" name="CustomShape 6"/>
-          <p:cNvSpPr/>
-          <p:nvPr/>
-        </p:nvSpPr>
-        <p:spPr>
-          <a:xfrm>
-            <a:off x="6214680" y="5482440"/>
-            <a:ext cx="3182760" cy="1371240"/>
-          </a:xfrm>
-          <a:prstGeom prst="wedgeRoundRectCallout">
-            <a:avLst>
-              <a:gd fmla="val -2284" name="adj1"/>
-              <a:gd fmla="val -13532" name="adj2"/>
-            </a:avLst>
-          </a:prstGeom>
-          <a:solidFill>
-            <a:srgbClr val="cfe7f5"/>
-          </a:solidFill>
-          <a:ln>
-            <a:solidFill>
-              <a:srgbClr val="808080"/>
-            </a:solidFill>
-          </a:ln>
-        </p:spPr>
-        <p:txBody>
-          <a:bodyPr anchor="ctr" bIns="45000" lIns="90000" rIns="90000" tIns="45000" wrap="none"/>
-          <a:p>
-            <a:pPr algn="ctr"/>
-            <a:r>
-              <a:rPr lang="en-US"/>
-              <a:t>Least amount of new</a:t>
-            </a:r>
-            <a:endParaRPr/>
-          </a:p>
-          <a:p>
-            <a:pPr algn="ctr"/>
-            <a:r>
-              <a:rPr lang="en-US"/>
-              <a:t>Code for constrained</a:t>
-            </a:r>
-            <a:endParaRPr/>
-          </a:p>
-          <a:p>
-            <a:pPr algn="ctr"/>
-            <a:r>
-              <a:rPr lang="en-US"/>
-              <a:t>Devices, highest </a:t>
-            </a:r>
-            <a:endParaRPr/>
-          </a:p>
-          <a:p>
-            <a:pPr algn="ctr"/>
-            <a:r>
-              <a:rPr lang="en-US"/>
-              <a:t>Resistance to DoS</a:t>
-            </a:r>
-            <a:endParaRPr/>
-          </a:p>
-          <a:p>
-            <a:pPr algn="ctr"/>
-            <a:r>
-              <a:rPr lang="en-US"/>
-              <a:t>Costs some bandwidth</a:t>
+              <a:t>ANIMA</a:t>
             </a:r>
             <a:endParaRPr/>
           </a:p>
@@ -2750,6 +3354,35 @@
       </p:sp>
     </p:spTree>
   </p:cSld>
+  <p:timing>
+    <p:tnLst>
+      <p:par>
+        <p:cTn dur="indefinite" id="5" nodeType="tmRoot" restart="never">
+          <p:childTnLst>
+            <p:seq>
+              <p:cTn id="6" nodeType="mainSeq">
+                <p:childTnLst/>
+              </p:cTn>
+              <p:prevCondLst>
+                <p:cond delay="0" evt="onPrev">
+                  <p:tgtEl>
+                    <p:sldTgt/>
+                  </p:tgtEl>
+                </p:cond>
+              </p:prevCondLst>
+              <p:nextCondLst>
+                <p:cond delay="0" evt="onNext">
+                  <p:tgtEl>
+                    <p:sldTgt/>
+                  </p:tgtEl>
+                </p:cond>
+              </p:nextCondLst>
+            </p:seq>
+          </p:childTnLst>
+        </p:cTn>
+      </p:par>
+    </p:tnLst>
+  </p:timing>
 </p:sld>
 </file>
 
@@ -2772,7 +3405,7 @@
       </p:grpSpPr>
       <p:sp>
         <p:nvSpPr>
-          <p:cNvPr id="60" name="TextShape 1"/>
+          <p:cNvPr id="69" name="TextShape 1"/>
           <p:cNvSpPr txBox="1"/>
           <p:nvPr/>
         </p:nvSpPr>
@@ -2791,7 +3424,7 @@
             <a:pPr algn="ctr"/>
             <a:r>
               <a:rPr lang="en-US"/>
-              <a:t>Funny Icons for other slides</a:t>
+              <a:t>Network Diagram: NETCONF</a:t>
             </a:r>
             <a:endParaRPr/>
           </a:p>
@@ -2799,7 +3432,7 @@
       </p:sp>
       <p:pic>
         <p:nvPicPr>
-          <p:cNvPr descr="" id="61" name=""/>
+          <p:cNvPr descr="" id="70" name=""/>
           <p:cNvPicPr/>
           <p:nvPr/>
         </p:nvPicPr>
@@ -2811,14 +3444,592 @@
         </p:blipFill>
         <p:spPr>
           <a:xfrm>
-            <a:off x="2664000" y="3816000"/>
-            <a:ext cx="1294560" cy="1195200"/>
+            <a:off x="172800" y="1728000"/>
+            <a:ext cx="9835200" cy="3920760"/>
           </a:xfrm>
           <a:prstGeom prst="rect">
             <a:avLst/>
           </a:prstGeom>
         </p:spPr>
       </p:pic>
+    </p:spTree>
+  </p:cSld>
+  <p:timing>
+    <p:tnLst>
+      <p:par>
+        <p:cTn dur="indefinite" id="7" nodeType="tmRoot" restart="never">
+          <p:childTnLst>
+            <p:seq>
+              <p:cTn id="8" nodeType="mainSeq">
+                <p:childTnLst/>
+              </p:cTn>
+              <p:prevCondLst>
+                <p:cond delay="0" evt="onPrev">
+                  <p:tgtEl>
+                    <p:sldTgt/>
+                  </p:tgtEl>
+                </p:cond>
+              </p:prevCondLst>
+              <p:nextCondLst>
+                <p:cond delay="0" evt="onNext">
+                  <p:tgtEl>
+                    <p:sldTgt/>
+                  </p:tgtEl>
+                </p:cond>
+              </p:nextCondLst>
+            </p:seq>
+          </p:childTnLst>
+        </p:cTn>
+      </p:par>
+    </p:tnLst>
+  </p:timing>
+</p:sld>
+</file>
+
+<file path=ppt/slides/slide8.xml><?xml version="1.0" encoding="utf-8"?>
+<p:sld xmlns:a="http://schemas.openxmlformats.org/drawingml/2006/main" xmlns:p="http://schemas.openxmlformats.org/presentationml/2006/main" xmlns:r="http://schemas.openxmlformats.org/officeDocument/2006/relationships">
+  <p:cSld>
+    <p:spTree>
+      <p:nvGrpSpPr>
+        <p:cNvPr id="1" name=""/>
+        <p:cNvGrpSpPr/>
+        <p:nvPr/>
+      </p:nvGrpSpPr>
+      <p:grpSpPr>
+        <a:xfrm>
+          <a:off x="0" y="0"/>
+          <a:ext cx="0" cy="0"/>
+          <a:chOff x="0" y="0"/>
+          <a:chExt cx="0" cy="0"/>
+        </a:xfrm>
+      </p:grpSpPr>
+      <p:sp>
+        <p:nvSpPr>
+          <p:cNvPr id="71" name="TextShape 1"/>
+          <p:cNvSpPr txBox="1"/>
+          <p:nvPr/>
+        </p:nvSpPr>
+        <p:spPr>
+          <a:xfrm>
+            <a:off x="504000" y="301320"/>
+            <a:ext cx="9071640" cy="1262160"/>
+          </a:xfrm>
+          <a:prstGeom prst="rect">
+            <a:avLst/>
+          </a:prstGeom>
+        </p:spPr>
+        <p:txBody>
+          <a:bodyPr anchor="ctr" bIns="0" lIns="0" rIns="0" tIns="0" wrap="none"/>
+          <a:p>
+            <a:pPr algn="ctr"/>
+            <a:r>
+              <a:rPr lang="en-US" sz="3600"/>
+              <a:t>New Node /Registrar communications</a:t>
+            </a:r>
+            <a:endParaRPr/>
+          </a:p>
+        </p:txBody>
+      </p:sp>
+      <p:sp>
+        <p:nvSpPr>
+          <p:cNvPr id="72" name="TextShape 2"/>
+          <p:cNvSpPr txBox="1"/>
+          <p:nvPr/>
+        </p:nvSpPr>
+        <p:spPr>
+          <a:xfrm>
+            <a:off x="504000" y="1769040"/>
+            <a:ext cx="4426920" cy="4384080"/>
+          </a:xfrm>
+          <a:prstGeom prst="rect">
+            <a:avLst/>
+          </a:prstGeom>
+        </p:spPr>
+        <p:txBody>
+          <a:bodyPr bIns="0" lIns="0" rIns="0" tIns="0" wrap="none"/>
+          <a:p>
+            <a:pPr>
+              <a:buSzPct val="45000"/>
+              <a:buFont typeface="StarSymbol"/>
+              <a:buChar char=""/>
+            </a:pPr>
+            <a:r>
+              <a:rPr lang="en-US"/>
+              <a:t>New Node ↔ Proxy use Link Local addresses.</a:t>
+            </a:r>
+            <a:endParaRPr/>
+          </a:p>
+          <a:p>
+            <a:pPr>
+              <a:buSzPct val="45000"/>
+              <a:buFont typeface="StarSymbol"/>
+              <a:buChar char=""/>
+            </a:pPr>
+            <a:r>
+              <a:rPr lang="en-US"/>
+              <a:t>Communication is CoAP/DTLS over UDP</a:t>
+            </a:r>
+            <a:endParaRPr/>
+          </a:p>
+          <a:p>
+            <a:pPr lvl="1">
+              <a:buSzPct val="75000"/>
+              <a:buFont typeface="StarSymbol"/>
+              <a:buChar char=""/>
+            </a:pPr>
+            <a:r>
+              <a:rPr lang="en-US" sz="1300"/>
+              <a:t>(or HTTPS/TCP)</a:t>
+            </a:r>
+            <a:endParaRPr/>
+          </a:p>
+          <a:p>
+            <a:pPr>
+              <a:buSzPct val="45000"/>
+              <a:buFont typeface="StarSymbol"/>
+              <a:buChar char=""/>
+            </a:pPr>
+            <a:r>
+              <a:rPr lang="en-US"/>
+              <a:t>Proxy ↔ Registrar communication is forwarded (D)TLS traffic; proxy is uninvolved in security. </a:t>
+            </a:r>
+            <a:endParaRPr/>
+          </a:p>
+          <a:p>
+            <a:pPr lvl="1">
+              <a:buSzPct val="75000"/>
+              <a:buFont typeface="StarSymbol"/>
+              <a:buChar char=""/>
+            </a:pPr>
+            <a:r>
+              <a:rPr lang="en-US" sz="1300"/>
+              <a:t>Proxy is neither trusted, nor needs to be truthworthy</a:t>
+            </a:r>
+            <a:endParaRPr/>
+          </a:p>
+          <a:p>
+            <a:pPr>
+              <a:buSzPct val="45000"/>
+              <a:buFont typeface="StarSymbol"/>
+              <a:buChar char=""/>
+            </a:pPr>
+            <a:r>
+              <a:rPr lang="en-US" sz="1300"/>
+              <a:t>Green Encapsulation arrow can be implemented in different ways</a:t>
+            </a:r>
+            <a:endParaRPr/>
+          </a:p>
+        </p:txBody>
+      </p:sp>
+    </p:spTree>
+  </p:cSld>
+</p:sld>
+</file>
+
+<file path=ppt/slides/slide9.xml><?xml version="1.0" encoding="utf-8"?>
+<p:sld xmlns:a="http://schemas.openxmlformats.org/drawingml/2006/main" xmlns:p="http://schemas.openxmlformats.org/presentationml/2006/main" xmlns:r="http://schemas.openxmlformats.org/officeDocument/2006/relationships">
+  <p:cSld>
+    <p:spTree>
+      <p:nvGrpSpPr>
+        <p:cNvPr id="1" name=""/>
+        <p:cNvGrpSpPr/>
+        <p:nvPr/>
+      </p:nvGrpSpPr>
+      <p:grpSpPr>
+        <a:xfrm>
+          <a:off x="0" y="0"/>
+          <a:ext cx="0" cy="0"/>
+          <a:chOff x="0" y="0"/>
+          <a:chExt cx="0" cy="0"/>
+        </a:xfrm>
+      </p:grpSpPr>
+      <p:sp>
+        <p:nvSpPr>
+          <p:cNvPr id="73" name="TextShape 1"/>
+          <p:cNvSpPr txBox="1"/>
+          <p:nvPr/>
+        </p:nvSpPr>
+        <p:spPr>
+          <a:xfrm>
+            <a:off x="504000" y="301320"/>
+            <a:ext cx="9071640" cy="1262160"/>
+          </a:xfrm>
+          <a:prstGeom prst="rect">
+            <a:avLst/>
+          </a:prstGeom>
+        </p:spPr>
+        <p:txBody>
+          <a:bodyPr anchor="ctr" bIns="0" lIns="0" rIns="0" tIns="0" wrap="none"/>
+          <a:p>
+            <a:pPr algn="ctr"/>
+            <a:r>
+              <a:rPr lang="en-US"/>
+              <a:t>Proxy/Join Assistant proxy methods</a:t>
+            </a:r>
+            <a:endParaRPr/>
+          </a:p>
+        </p:txBody>
+      </p:sp>
+      <p:sp>
+        <p:nvSpPr>
+          <p:cNvPr id="74" name="TextShape 2"/>
+          <p:cNvSpPr txBox="1"/>
+          <p:nvPr/>
+        </p:nvSpPr>
+        <p:spPr>
+          <a:xfrm>
+            <a:off x="504000" y="1769040"/>
+            <a:ext cx="4426920" cy="4384080"/>
+          </a:xfrm>
+          <a:prstGeom prst="rect">
+            <a:avLst/>
+          </a:prstGeom>
+        </p:spPr>
+        <p:txBody>
+          <a:bodyPr bIns="0" lIns="0" rIns="0" tIns="0" wrap="none"/>
+          <a:p>
+            <a:r>
+              <a:rPr lang="en-US"/>
+              <a:t>HTTPS</a:t>
+            </a:r>
+            <a:endParaRPr/>
+          </a:p>
+          <a:p>
+            <a:pPr lvl="1">
+              <a:buFont typeface="StarSymbol"/>
+              <a:buAutoNum type="arabicPeriod"/>
+            </a:pPr>
+            <a:r>
+              <a:rPr lang="en-US"/>
+              <a:t>Via circuit proxy (process per connection), or HTTP proxy.</a:t>
+            </a:r>
+            <a:endParaRPr/>
+          </a:p>
+          <a:p>
+            <a:pPr lvl="1">
+              <a:buFont typeface="StarSymbol"/>
+              <a:buAutoNum type="arabicPeriod"/>
+            </a:pPr>
+            <a:r>
+              <a:rPr lang="en-US"/>
+              <a:t>Via NAT66 of link-layer enrollment addresses to ACP ULA address </a:t>
+            </a:r>
+            <a:endParaRPr/>
+          </a:p>
+          <a:p>
+            <a:pPr lvl="1">
+              <a:buFont typeface="StarSymbol"/>
+              <a:buAutoNum type="arabicPeriod"/>
+            </a:pPr>
+            <a:r>
+              <a:rPr lang="en-US"/>
+              <a:t>Stateless IPIP encapsulation of link-local traffic to registar</a:t>
+            </a:r>
+            <a:endParaRPr/>
+          </a:p>
+        </p:txBody>
+      </p:sp>
+      <p:sp>
+        <p:nvSpPr>
+          <p:cNvPr id="75" name="TextShape 3"/>
+          <p:cNvSpPr txBox="1"/>
+          <p:nvPr/>
+        </p:nvSpPr>
+        <p:spPr>
+          <a:xfrm>
+            <a:off x="5152680" y="1769040"/>
+            <a:ext cx="4426920" cy="4384080"/>
+          </a:xfrm>
+          <a:prstGeom prst="rect">
+            <a:avLst/>
+          </a:prstGeom>
+        </p:spPr>
+        <p:txBody>
+          <a:bodyPr bIns="0" lIns="0" rIns="0" tIns="0" wrap="none"/>
+          <a:p>
+            <a:r>
+              <a:rPr lang="en-US"/>
+              <a:t>CoAP/DTLS</a:t>
+            </a:r>
+            <a:endParaRPr/>
+          </a:p>
+          <a:p>
+            <a:pPr>
+              <a:buFont typeface="StarSymbol"/>
+              <a:buAutoNum type="arabicPeriod"/>
+            </a:pPr>
+            <a:r>
+              <a:rPr lang="en-US"/>
+              <a:t> </a:t>
+            </a:r>
+            <a:r>
+              <a:rPr lang="en-US"/>
+              <a:t>UDP circuit proxy</a:t>
+            </a:r>
+            <a:endParaRPr/>
+          </a:p>
+          <a:p>
+            <a:pPr>
+              <a:buFont typeface="StarSymbol"/>
+              <a:buAutoNum type="arabicPeriod"/>
+            </a:pPr>
+            <a:r>
+              <a:rPr lang="en-US"/>
+              <a:t> </a:t>
+            </a:r>
+            <a:r>
+              <a:rPr lang="en-US"/>
+              <a:t>NAT66 of link-layer to ACP ULA address</a:t>
+            </a:r>
+            <a:endParaRPr/>
+          </a:p>
+          <a:p>
+            <a:pPr>
+              <a:buFont typeface="StarSymbol"/>
+              <a:buAutoNum type="arabicPeriod"/>
+            </a:pPr>
+            <a:r>
+              <a:rPr lang="en-US"/>
+              <a:t> </a:t>
+            </a:r>
+            <a:r>
+              <a:rPr lang="en-US"/>
+              <a:t>Stateless IPIP encapsulation of link-local traffic to registrar</a:t>
+            </a:r>
+            <a:endParaRPr/>
+          </a:p>
+          <a:p>
+            <a:pPr lvl="1">
+              <a:buFont typeface="StarSymbol"/>
+              <a:buAutoNum type="alphaLcParenR"/>
+            </a:pPr>
+            <a:r>
+              <a:rPr lang="en-US"/>
+              <a:t> </a:t>
+            </a:r>
+            <a:r>
+              <a:rPr lang="en-US"/>
+              <a:t>Essentially this is routing-dispatch IPIP encapsulation</a:t>
+            </a:r>
+            <a:endParaRPr/>
+          </a:p>
+        </p:txBody>
+      </p:sp>
+      <p:sp>
+        <p:nvSpPr>
+          <p:cNvPr id="76" name="TextShape 4"/>
+          <p:cNvSpPr txBox="1"/>
+          <p:nvPr/>
+        </p:nvSpPr>
+        <p:spPr>
+          <a:xfrm>
+            <a:off x="673920" y="6853680"/>
+            <a:ext cx="8479440" cy="858240"/>
+          </a:xfrm>
+          <a:prstGeom prst="rect">
+            <a:avLst/>
+          </a:prstGeom>
+        </p:spPr>
+        <p:txBody>
+          <a:bodyPr bIns="45000" lIns="90000" rIns="90000" tIns="45000" wrap="none"/>
+          <a:p>
+            <a:r>
+              <a:rPr lang="en-US"/>
+              <a:t>See draft-richardson-anima-state-for-joinrouter-00: Considerations for stateful vs stateless join router in ANIMA bootstrap, for longer discussion</a:t>
+            </a:r>
+            <a:endParaRPr/>
+          </a:p>
+          <a:p>
+            <a:r>
+              <a:rPr lang="en-US"/>
+              <a:t>             </a:t>
+            </a:r>
+            <a:endParaRPr/>
+          </a:p>
+        </p:txBody>
+      </p:sp>
+      <p:pic>
+        <p:nvPicPr>
+          <p:cNvPr descr="" id="77" name=""/>
+          <p:cNvPicPr/>
+          <p:nvPr/>
+        </p:nvPicPr>
+        <p:blipFill>
+          <a:blip r:embed="rId1"/>
+          <a:stretch>
+            <a:fillRect/>
+          </a:stretch>
+        </p:blipFill>
+        <p:spPr>
+          <a:xfrm>
+            <a:off x="399240" y="3070440"/>
+            <a:ext cx="447120" cy="542880"/>
+          </a:xfrm>
+          <a:prstGeom prst="rect">
+            <a:avLst/>
+          </a:prstGeom>
+        </p:spPr>
+      </p:pic>
+      <p:pic>
+        <p:nvPicPr>
+          <p:cNvPr descr="" id="78" name=""/>
+          <p:cNvPicPr/>
+          <p:nvPr/>
+        </p:nvPicPr>
+        <p:blipFill>
+          <a:blip r:embed="rId2"/>
+          <a:stretch>
+            <a:fillRect/>
+          </a:stretch>
+        </p:blipFill>
+        <p:spPr>
+          <a:xfrm>
+            <a:off x="4618440" y="3888360"/>
+            <a:ext cx="534240" cy="471600"/>
+          </a:xfrm>
+          <a:prstGeom prst="rect">
+            <a:avLst/>
+          </a:prstGeom>
+        </p:spPr>
+      </p:pic>
+      <p:pic>
+        <p:nvPicPr>
+          <p:cNvPr descr="" id="79" name=""/>
+          <p:cNvPicPr/>
+          <p:nvPr/>
+        </p:nvPicPr>
+        <p:blipFill>
+          <a:blip r:embed="rId3"/>
+          <a:stretch>
+            <a:fillRect/>
+          </a:stretch>
+        </p:blipFill>
+        <p:spPr>
+          <a:xfrm>
+            <a:off x="4556880" y="2445480"/>
+            <a:ext cx="433080" cy="399960"/>
+          </a:xfrm>
+          <a:prstGeom prst="rect">
+            <a:avLst/>
+          </a:prstGeom>
+        </p:spPr>
+      </p:pic>
+      <p:sp>
+        <p:nvSpPr>
+          <p:cNvPr id="80" name="CustomShape 5"/>
+          <p:cNvSpPr/>
+          <p:nvPr/>
+        </p:nvSpPr>
+        <p:spPr>
+          <a:xfrm>
+            <a:off x="139320" y="5180400"/>
+            <a:ext cx="3101400" cy="1567080"/>
+          </a:xfrm>
+          <a:prstGeom prst="cloudCallout">
+            <a:avLst>
+              <a:gd fmla="val 3401" name="adj1"/>
+              <a:gd fmla="val -23683" name="adj2"/>
+            </a:avLst>
+          </a:prstGeom>
+          <a:solidFill>
+            <a:srgbClr val="cfe7f5"/>
+          </a:solidFill>
+          <a:ln>
+            <a:solidFill>
+              <a:srgbClr val="808080"/>
+            </a:solidFill>
+          </a:ln>
+        </p:spPr>
+        <p:txBody>
+          <a:bodyPr anchor="ctr" bIns="45000" lIns="90000" rIns="90000" tIns="45000" wrap="none"/>
+          <a:p>
+            <a:pPr algn="ctr"/>
+            <a:r>
+              <a:rPr lang="en-US"/>
+              <a:t>Brian Carpenter </a:t>
+            </a:r>
+            <a:endParaRPr/>
+          </a:p>
+          <a:p>
+            <a:pPr algn="ctr"/>
+            <a:r>
+              <a:rPr lang="en-US"/>
+              <a:t>was visibly ill</a:t>
+            </a:r>
+            <a:endParaRPr/>
+          </a:p>
+        </p:txBody>
+      </p:sp>
+      <p:sp>
+        <p:nvSpPr>
+          <p:cNvPr id="81" name="CustomShape 6"/>
+          <p:cNvSpPr/>
+          <p:nvPr/>
+        </p:nvSpPr>
+        <p:spPr>
+          <a:xfrm>
+            <a:off x="6214680" y="5482440"/>
+            <a:ext cx="3182760" cy="1371240"/>
+          </a:xfrm>
+          <a:prstGeom prst="wedgeRoundRectCallout">
+            <a:avLst>
+              <a:gd fmla="val -2284" name="adj1"/>
+              <a:gd fmla="val -13532" name="adj2"/>
+            </a:avLst>
+          </a:prstGeom>
+          <a:solidFill>
+            <a:srgbClr val="cfe7f5"/>
+          </a:solidFill>
+          <a:ln>
+            <a:solidFill>
+              <a:srgbClr val="808080"/>
+            </a:solidFill>
+          </a:ln>
+        </p:spPr>
+        <p:txBody>
+          <a:bodyPr anchor="ctr" bIns="45000" lIns="90000" rIns="90000" tIns="45000" wrap="none"/>
+          <a:p>
+            <a:pPr algn="ctr"/>
+            <a:r>
+              <a:rPr lang="en-US"/>
+              <a:t>Least amount of new</a:t>
+            </a:r>
+            <a:endParaRPr/>
+          </a:p>
+          <a:p>
+            <a:pPr algn="ctr"/>
+            <a:r>
+              <a:rPr lang="en-US"/>
+              <a:t>Code for constrained</a:t>
+            </a:r>
+            <a:endParaRPr/>
+          </a:p>
+          <a:p>
+            <a:pPr algn="ctr"/>
+            <a:r>
+              <a:rPr lang="en-US"/>
+              <a:t>Devices, highest </a:t>
+            </a:r>
+            <a:endParaRPr/>
+          </a:p>
+          <a:p>
+            <a:pPr algn="ctr"/>
+            <a:r>
+              <a:rPr lang="en-US"/>
+              <a:t>Resistance to DoS</a:t>
+            </a:r>
+            <a:endParaRPr/>
+          </a:p>
+          <a:p>
+            <a:pPr algn="ctr"/>
+            <a:r>
+              <a:rPr lang="en-US"/>
+              <a:t>Costs some bandwidth</a:t>
+            </a:r>
+            <a:endParaRPr/>
+          </a:p>
+        </p:txBody>
+      </p:sp>
     </p:spTree>
   </p:cSld>
 </p:sld>

</xml_diff>